<commit_message>
added new powerpoint and lesson plan
</commit_message>
<xml_diff>
--- a/tf_idf teaching_in_pub_health.pptx
+++ b/tf_idf teaching_in_pub_health.pptx
@@ -5,19 +5,23 @@
     <p:sldMasterId id="2147483648" r:id="rId4"/>
   </p:sldMasterIdLst>
   <p:notesMasterIdLst>
-    <p:notesMasterId r:id="rId15"/>
+    <p:notesMasterId r:id="rId19"/>
   </p:notesMasterIdLst>
   <p:sldIdLst>
     <p:sldId id="256" r:id="rId5"/>
-    <p:sldId id="257" r:id="rId6"/>
-    <p:sldId id="266" r:id="rId7"/>
-    <p:sldId id="262" r:id="rId8"/>
-    <p:sldId id="261" r:id="rId9"/>
-    <p:sldId id="269" r:id="rId10"/>
-    <p:sldId id="268" r:id="rId11"/>
-    <p:sldId id="265" r:id="rId12"/>
-    <p:sldId id="267" r:id="rId13"/>
-    <p:sldId id="263" r:id="rId14"/>
+    <p:sldId id="271" r:id="rId6"/>
+    <p:sldId id="272" r:id="rId7"/>
+    <p:sldId id="273" r:id="rId8"/>
+    <p:sldId id="266" r:id="rId9"/>
+    <p:sldId id="257" r:id="rId10"/>
+    <p:sldId id="262" r:id="rId11"/>
+    <p:sldId id="261" r:id="rId12"/>
+    <p:sldId id="269" r:id="rId13"/>
+    <p:sldId id="268" r:id="rId14"/>
+    <p:sldId id="270" r:id="rId15"/>
+    <p:sldId id="265" r:id="rId16"/>
+    <p:sldId id="267" r:id="rId17"/>
+    <p:sldId id="263" r:id="rId18"/>
   </p:sldIdLst>
   <p:sldSz cx="12192000" cy="6858000"/>
   <p:notesSz cx="6858000" cy="9144000"/>
@@ -127,84 +131,9 @@
 <file path=ppt/revisionInfo.xml><?xml version="1.0" encoding="utf-8"?>
 <p1510:revInfo xmlns:a="http://schemas.openxmlformats.org/drawingml/2006/main" xmlns:r="http://schemas.openxmlformats.org/officeDocument/2006/relationships" xmlns:p1510="http://schemas.microsoft.com/office/powerpoint/2015/10/main">
   <p1510:revLst>
-    <p1510:client id="{839475C1-5A37-4E60-AF11-2C22A640D73C}" v="2" dt="2021-10-20T00:25:17.007"/>
+    <p1510:client id="{99362BCD-4E8F-4CAE-875B-1AAEF1924613}" v="5" dt="2021-10-25T17:02:05.366"/>
   </p1510:revLst>
 </p1510:revInfo>
-</file>
-
-<file path=ppt/changesInfos/changesInfo1.xml><?xml version="1.0" encoding="utf-8"?>
-<pc:chgInfo xmlns:a="http://schemas.openxmlformats.org/drawingml/2006/main" xmlns:r="http://schemas.openxmlformats.org/officeDocument/2006/relationships" xmlns:ac="http://schemas.microsoft.com/office/drawing/2013/main/command" xmlns:pc="http://schemas.microsoft.com/office/powerpoint/2013/main/command">
-  <pc:docChgLst>
-    <pc:chgData name="Andrew Walker" userId="15e969be-eef3-47ac-ad40-e5858494d6a0" providerId="ADAL" clId="{839475C1-5A37-4E60-AF11-2C22A640D73C}"/>
-    <pc:docChg chg="custSel addSld delSld modSld">
-      <pc:chgData name="Andrew Walker" userId="15e969be-eef3-47ac-ad40-e5858494d6a0" providerId="ADAL" clId="{839475C1-5A37-4E60-AF11-2C22A640D73C}" dt="2021-10-20T00:29:16.183" v="843" actId="20577"/>
-      <pc:docMkLst>
-        <pc:docMk/>
-      </pc:docMkLst>
-      <pc:sldChg chg="addSp delSp modSp mod">
-        <pc:chgData name="Andrew Walker" userId="15e969be-eef3-47ac-ad40-e5858494d6a0" providerId="ADAL" clId="{839475C1-5A37-4E60-AF11-2C22A640D73C}" dt="2021-10-20T00:19:43.923" v="38" actId="1076"/>
-        <pc:sldMkLst>
-          <pc:docMk/>
-          <pc:sldMk cId="3020076989" sldId="268"/>
-        </pc:sldMkLst>
-        <pc:spChg chg="del mod">
-          <ac:chgData name="Andrew Walker" userId="15e969be-eef3-47ac-ad40-e5858494d6a0" providerId="ADAL" clId="{839475C1-5A37-4E60-AF11-2C22A640D73C}" dt="2021-10-20T00:19:15.778" v="30" actId="478"/>
-          <ac:spMkLst>
-            <pc:docMk/>
-            <pc:sldMk cId="3020076989" sldId="268"/>
-            <ac:spMk id="2" creationId="{6C4817FC-2593-4E23-BEBA-36991400BD22}"/>
-          </ac:spMkLst>
-        </pc:spChg>
-        <pc:spChg chg="del">
-          <ac:chgData name="Andrew Walker" userId="15e969be-eef3-47ac-ad40-e5858494d6a0" providerId="ADAL" clId="{839475C1-5A37-4E60-AF11-2C22A640D73C}" dt="2021-10-20T00:19:14.506" v="29" actId="478"/>
-          <ac:spMkLst>
-            <pc:docMk/>
-            <pc:sldMk cId="3020076989" sldId="268"/>
-            <ac:spMk id="3" creationId="{70887750-C280-4F14-A528-4053F057897A}"/>
-          </ac:spMkLst>
-        </pc:spChg>
-        <pc:picChg chg="add mod">
-          <ac:chgData name="Andrew Walker" userId="15e969be-eef3-47ac-ad40-e5858494d6a0" providerId="ADAL" clId="{839475C1-5A37-4E60-AF11-2C22A640D73C}" dt="2021-10-20T00:19:43.923" v="38" actId="1076"/>
-          <ac:picMkLst>
-            <pc:docMk/>
-            <pc:sldMk cId="3020076989" sldId="268"/>
-            <ac:picMk id="5" creationId="{4A3EC2A8-68E7-414A-8900-358624A1C6A4}"/>
-          </ac:picMkLst>
-        </pc:picChg>
-      </pc:sldChg>
-      <pc:sldChg chg="modSp new mod">
-        <pc:chgData name="Andrew Walker" userId="15e969be-eef3-47ac-ad40-e5858494d6a0" providerId="ADAL" clId="{839475C1-5A37-4E60-AF11-2C22A640D73C}" dt="2021-10-20T00:29:16.183" v="843" actId="20577"/>
-        <pc:sldMkLst>
-          <pc:docMk/>
-          <pc:sldMk cId="1209700120" sldId="269"/>
-        </pc:sldMkLst>
-        <pc:spChg chg="mod">
-          <ac:chgData name="Andrew Walker" userId="15e969be-eef3-47ac-ad40-e5858494d6a0" providerId="ADAL" clId="{839475C1-5A37-4E60-AF11-2C22A640D73C}" dt="2021-10-20T00:20:32.432" v="79" actId="20577"/>
-          <ac:spMkLst>
-            <pc:docMk/>
-            <pc:sldMk cId="1209700120" sldId="269"/>
-            <ac:spMk id="2" creationId="{D0041A93-90AE-4287-8C58-163297F2FF3C}"/>
-          </ac:spMkLst>
-        </pc:spChg>
-        <pc:spChg chg="mod">
-          <ac:chgData name="Andrew Walker" userId="15e969be-eef3-47ac-ad40-e5858494d6a0" providerId="ADAL" clId="{839475C1-5A37-4E60-AF11-2C22A640D73C}" dt="2021-10-20T00:29:16.183" v="843" actId="20577"/>
-          <ac:spMkLst>
-            <pc:docMk/>
-            <pc:sldMk cId="1209700120" sldId="269"/>
-            <ac:spMk id="3" creationId="{8FE7FA59-A299-4AF3-92CF-0B41EDD8AB35}"/>
-          </ac:spMkLst>
-        </pc:spChg>
-      </pc:sldChg>
-      <pc:sldChg chg="new del">
-        <pc:chgData name="Andrew Walker" userId="15e969be-eef3-47ac-ad40-e5858494d6a0" providerId="ADAL" clId="{839475C1-5A37-4E60-AF11-2C22A640D73C}" dt="2021-10-20T00:24:20.145" v="81" actId="47"/>
-        <pc:sldMkLst>
-          <pc:docMk/>
-          <pc:sldMk cId="2471150459" sldId="270"/>
-        </pc:sldMkLst>
-      </pc:sldChg>
-    </pc:docChg>
-  </pc:docChgLst>
-</pc:chgInfo>
 </file>
 
 <file path=ppt/notesMasters/notesMaster1.xml><?xml version="1.0" encoding="utf-8"?>
@@ -289,7 +218,7 @@
           <a:p>
             <a:fld id="{E05391F7-2808-441B-A8E9-FCE5CBFC0F88}" type="datetimeFigureOut">
               <a:rPr lang="en-US" smtClean="0"/>
-              <a:t>10/19/2021</a:t>
+              <a:t>10/25/2021</a:t>
             </a:fld>
             <a:endParaRPr lang="en-US"/>
           </a:p>
@@ -600,7 +529,10 @@
           <a:bodyPr/>
           <a:lstStyle/>
           <a:p>
-            <a:endParaRPr lang="en-US" dirty="0"/>
+            <a:r>
+              <a:rPr lang="en-US" dirty="0"/>
+              <a:t>DC: Maybe add in some learning objectives, could start the lesson with an opening question to get students engaged</a:t>
+            </a:r>
           </a:p>
         </p:txBody>
       </p:sp>
@@ -621,7 +553,7 @@
           <a:p>
             <a:fld id="{0A1D361F-B9A5-4658-B8D3-6D7CE0425BEB}" type="slidenum">
               <a:rPr lang="en-US" smtClean="0"/>
-              <a:t>3</a:t>
+              <a:t>1</a:t>
             </a:fld>
             <a:endParaRPr lang="en-US"/>
           </a:p>
@@ -630,7 +562,7 @@
     </p:spTree>
     <p:extLst>
       <p:ext uri="{BB962C8B-B14F-4D97-AF65-F5344CB8AC3E}">
-        <p14:creationId xmlns:p14="http://schemas.microsoft.com/office/powerpoint/2010/main" val="1384305712"/>
+        <p14:creationId xmlns:p14="http://schemas.microsoft.com/office/powerpoint/2010/main" val="2726770211"/>
       </p:ext>
     </p:extLst>
   </p:cSld>
@@ -686,28 +618,22 @@
           <a:p>
             <a:r>
               <a:rPr lang="en-US" dirty="0"/>
-              <a:t>Tf-idf example from Julia </a:t>
+              <a:t>For these types of analyses bag of words analyses– </a:t>
             </a:r>
             <a:r>
               <a:rPr lang="en-US" dirty="0" err="1"/>
-              <a:t>Silge’s</a:t>
+              <a:t>wordclouds</a:t>
             </a:r>
             <a:r>
               <a:rPr lang="en-US" dirty="0"/>
-              <a:t> Text Mining with R: A tidy approach</a:t>
-            </a:r>
-          </a:p>
-          <a:p>
-            <a:endParaRPr lang="en-US" dirty="0"/>
+              <a:t> especially are ruined by stopwords. </a:t>
+            </a:r>
           </a:p>
           <a:p>
             <a:r>
               <a:rPr lang="en-US" dirty="0"/>
-              <a:t>https://www.tidytextmining.com/tfidf.html </a:t>
-            </a:r>
-          </a:p>
-          <a:p>
-            <a:endParaRPr lang="en-US" dirty="0"/>
+              <a:t>For many context-specific analyses like word  embeddings, neural nets, stopwords are actually needed</a:t>
+            </a:r>
           </a:p>
         </p:txBody>
       </p:sp>
@@ -737,7 +663,7 @@
     </p:spTree>
     <p:extLst>
       <p:ext uri="{BB962C8B-B14F-4D97-AF65-F5344CB8AC3E}">
-        <p14:creationId xmlns:p14="http://schemas.microsoft.com/office/powerpoint/2010/main" val="1442963297"/>
+        <p14:creationId xmlns:p14="http://schemas.microsoft.com/office/powerpoint/2010/main" val="1654970170"/>
       </p:ext>
     </p:extLst>
   </p:cSld>
@@ -791,27 +717,7 @@
           <a:bodyPr/>
           <a:lstStyle/>
           <a:p>
-            <a:r>
-              <a:rPr lang="en-US" dirty="0"/>
-              <a:t>These words would likely have a high tf-idf– they are present exclusively in each field, or at least far </a:t>
-            </a:r>
-            <a:r>
-              <a:rPr lang="en-US" dirty="0" err="1"/>
-              <a:t>moreso</a:t>
-            </a:r>
-            <a:r>
-              <a:rPr lang="en-US" dirty="0"/>
-              <a:t> than both or all fields combined.</a:t>
-            </a:r>
-          </a:p>
-          <a:p>
             <a:endParaRPr lang="en-US" dirty="0"/>
-          </a:p>
-          <a:p>
-            <a:r>
-              <a:rPr lang="en-US" dirty="0"/>
-              <a:t>What words would have low tf-idf? Very common words throughout both, often stuff like “the, and, as, but, with, so , etc.) </a:t>
-            </a:r>
           </a:p>
         </p:txBody>
       </p:sp>
@@ -841,7 +747,416 @@
     </p:spTree>
     <p:extLst>
       <p:ext uri="{BB962C8B-B14F-4D97-AF65-F5344CB8AC3E}">
+        <p14:creationId xmlns:p14="http://schemas.microsoft.com/office/powerpoint/2010/main" val="1384305712"/>
+      </p:ext>
+    </p:extLst>
+  </p:cSld>
+  <p:clrMapOvr>
+    <a:masterClrMapping/>
+  </p:clrMapOvr>
+</p:notes>
+</file>
+
+<file path=ppt/notesSlides/notesSlide4.xml><?xml version="1.0" encoding="utf-8"?>
+<p:notes xmlns:a="http://schemas.openxmlformats.org/drawingml/2006/main" xmlns:r="http://schemas.openxmlformats.org/officeDocument/2006/relationships" xmlns:p="http://schemas.openxmlformats.org/presentationml/2006/main">
+  <p:cSld>
+    <p:spTree>
+      <p:nvGrpSpPr>
+        <p:cNvPr id="1" name=""/>
+        <p:cNvGrpSpPr/>
+        <p:nvPr/>
+      </p:nvGrpSpPr>
+      <p:grpSpPr>
+        <a:xfrm>
+          <a:off x="0" y="0"/>
+          <a:ext cx="0" cy="0"/>
+          <a:chOff x="0" y="0"/>
+          <a:chExt cx="0" cy="0"/>
+        </a:xfrm>
+      </p:grpSpPr>
+      <p:sp>
+        <p:nvSpPr>
+          <p:cNvPr id="2" name="Slide Image Placeholder 1"/>
+          <p:cNvSpPr>
+            <a:spLocks noGrp="1" noRot="1" noChangeAspect="1"/>
+          </p:cNvSpPr>
+          <p:nvPr>
+            <p:ph type="sldImg"/>
+          </p:nvPr>
+        </p:nvSpPr>
+        <p:spPr/>
+      </p:sp>
+      <p:sp>
+        <p:nvSpPr>
+          <p:cNvPr id="3" name="Notes Placeholder 2"/>
+          <p:cNvSpPr>
+            <a:spLocks noGrp="1"/>
+          </p:cNvSpPr>
+          <p:nvPr>
+            <p:ph type="body" idx="1"/>
+          </p:nvPr>
+        </p:nvSpPr>
+        <p:spPr/>
+        <p:txBody>
+          <a:bodyPr/>
+          <a:lstStyle/>
+          <a:p>
+            <a:r>
+              <a:rPr lang="en-US" dirty="0"/>
+              <a:t>Tf-idf example from Julia </a:t>
+            </a:r>
+            <a:r>
+              <a:rPr lang="en-US" dirty="0" err="1"/>
+              <a:t>Silge’s</a:t>
+            </a:r>
+            <a:r>
+              <a:rPr lang="en-US" dirty="0"/>
+              <a:t> Text Mining with R: A tidy approach</a:t>
+            </a:r>
+          </a:p>
+          <a:p>
+            <a:endParaRPr lang="en-US" dirty="0"/>
+          </a:p>
+          <a:p>
+            <a:r>
+              <a:rPr lang="en-US" dirty="0"/>
+              <a:t>https://www.tidytextmining.com/tfidf.html </a:t>
+            </a:r>
+          </a:p>
+          <a:p>
+            <a:endParaRPr lang="en-US" dirty="0"/>
+          </a:p>
+          <a:p>
+            <a:endParaRPr lang="en-US" dirty="0"/>
+          </a:p>
+          <a:p>
+            <a:r>
+              <a:rPr lang="en-US" dirty="0"/>
+              <a:t>Log is used to account for </a:t>
+            </a:r>
+          </a:p>
+        </p:txBody>
+      </p:sp>
+      <p:sp>
+        <p:nvSpPr>
+          <p:cNvPr id="4" name="Slide Number Placeholder 3"/>
+          <p:cNvSpPr>
+            <a:spLocks noGrp="1"/>
+          </p:cNvSpPr>
+          <p:nvPr>
+            <p:ph type="sldNum" sz="quarter" idx="5"/>
+          </p:nvPr>
+        </p:nvSpPr>
+        <p:spPr/>
+        <p:txBody>
+          <a:bodyPr/>
+          <a:lstStyle/>
+          <a:p>
+            <a:fld id="{0A1D361F-B9A5-4658-B8D3-6D7CE0425BEB}" type="slidenum">
+              <a:rPr lang="en-US" smtClean="0"/>
+              <a:t>7</a:t>
+            </a:fld>
+            <a:endParaRPr lang="en-US"/>
+          </a:p>
+        </p:txBody>
+      </p:sp>
+    </p:spTree>
+    <p:extLst>
+      <p:ext uri="{BB962C8B-B14F-4D97-AF65-F5344CB8AC3E}">
+        <p14:creationId xmlns:p14="http://schemas.microsoft.com/office/powerpoint/2010/main" val="1442963297"/>
+      </p:ext>
+    </p:extLst>
+  </p:cSld>
+  <p:clrMapOvr>
+    <a:masterClrMapping/>
+  </p:clrMapOvr>
+</p:notes>
+</file>
+
+<file path=ppt/notesSlides/notesSlide5.xml><?xml version="1.0" encoding="utf-8"?>
+<p:notes xmlns:a="http://schemas.openxmlformats.org/drawingml/2006/main" xmlns:r="http://schemas.openxmlformats.org/officeDocument/2006/relationships" xmlns:p="http://schemas.openxmlformats.org/presentationml/2006/main">
+  <p:cSld>
+    <p:spTree>
+      <p:nvGrpSpPr>
+        <p:cNvPr id="1" name=""/>
+        <p:cNvGrpSpPr/>
+        <p:nvPr/>
+      </p:nvGrpSpPr>
+      <p:grpSpPr>
+        <a:xfrm>
+          <a:off x="0" y="0"/>
+          <a:ext cx="0" cy="0"/>
+          <a:chOff x="0" y="0"/>
+          <a:chExt cx="0" cy="0"/>
+        </a:xfrm>
+      </p:grpSpPr>
+      <p:sp>
+        <p:nvSpPr>
+          <p:cNvPr id="2" name="Slide Image Placeholder 1"/>
+          <p:cNvSpPr>
+            <a:spLocks noGrp="1" noRot="1" noChangeAspect="1"/>
+          </p:cNvSpPr>
+          <p:nvPr>
+            <p:ph type="sldImg"/>
+          </p:nvPr>
+        </p:nvSpPr>
+        <p:spPr/>
+      </p:sp>
+      <p:sp>
+        <p:nvSpPr>
+          <p:cNvPr id="3" name="Notes Placeholder 2"/>
+          <p:cNvSpPr>
+            <a:spLocks noGrp="1"/>
+          </p:cNvSpPr>
+          <p:nvPr>
+            <p:ph type="body" idx="1"/>
+          </p:nvPr>
+        </p:nvSpPr>
+        <p:spPr/>
+        <p:txBody>
+          <a:bodyPr/>
+          <a:lstStyle/>
+          <a:p>
+            <a:r>
+              <a:rPr lang="en-US" dirty="0"/>
+              <a:t>These words would likely have a high tf-idf– they are present exclusively in each field, or at least far </a:t>
+            </a:r>
+            <a:r>
+              <a:rPr lang="en-US" dirty="0" err="1"/>
+              <a:t>moreso</a:t>
+            </a:r>
+            <a:r>
+              <a:rPr lang="en-US" dirty="0"/>
+              <a:t> than both or all fields combined.</a:t>
+            </a:r>
+          </a:p>
+          <a:p>
+            <a:endParaRPr lang="en-US" dirty="0"/>
+          </a:p>
+          <a:p>
+            <a:r>
+              <a:rPr lang="en-US" dirty="0"/>
+              <a:t>What words would have low tf-idf? Very common words throughout both, often stuff like “the, and, as, but, with, so , etc.) </a:t>
+            </a:r>
+          </a:p>
+        </p:txBody>
+      </p:sp>
+      <p:sp>
+        <p:nvSpPr>
+          <p:cNvPr id="4" name="Slide Number Placeholder 3"/>
+          <p:cNvSpPr>
+            <a:spLocks noGrp="1"/>
+          </p:cNvSpPr>
+          <p:nvPr>
+            <p:ph type="sldNum" sz="quarter" idx="5"/>
+          </p:nvPr>
+        </p:nvSpPr>
+        <p:spPr/>
+        <p:txBody>
+          <a:bodyPr/>
+          <a:lstStyle/>
+          <a:p>
+            <a:fld id="{0A1D361F-B9A5-4658-B8D3-6D7CE0425BEB}" type="slidenum">
+              <a:rPr lang="en-US" smtClean="0"/>
+              <a:t>8</a:t>
+            </a:fld>
+            <a:endParaRPr lang="en-US"/>
+          </a:p>
+        </p:txBody>
+      </p:sp>
+    </p:spTree>
+    <p:extLst>
+      <p:ext uri="{BB962C8B-B14F-4D97-AF65-F5344CB8AC3E}">
         <p14:creationId xmlns:p14="http://schemas.microsoft.com/office/powerpoint/2010/main" val="656105428"/>
+      </p:ext>
+    </p:extLst>
+  </p:cSld>
+  <p:clrMapOvr>
+    <a:masterClrMapping/>
+  </p:clrMapOvr>
+</p:notes>
+</file>
+
+<file path=ppt/notesSlides/notesSlide6.xml><?xml version="1.0" encoding="utf-8"?>
+<p:notes xmlns:a="http://schemas.openxmlformats.org/drawingml/2006/main" xmlns:r="http://schemas.openxmlformats.org/officeDocument/2006/relationships" xmlns:p="http://schemas.openxmlformats.org/presentationml/2006/main">
+  <p:cSld>
+    <p:spTree>
+      <p:nvGrpSpPr>
+        <p:cNvPr id="1" name=""/>
+        <p:cNvGrpSpPr/>
+        <p:nvPr/>
+      </p:nvGrpSpPr>
+      <p:grpSpPr>
+        <a:xfrm>
+          <a:off x="0" y="0"/>
+          <a:ext cx="0" cy="0"/>
+          <a:chOff x="0" y="0"/>
+          <a:chExt cx="0" cy="0"/>
+        </a:xfrm>
+      </p:grpSpPr>
+      <p:sp>
+        <p:nvSpPr>
+          <p:cNvPr id="2" name="Slide Image Placeholder 1"/>
+          <p:cNvSpPr>
+            <a:spLocks noGrp="1" noRot="1" noChangeAspect="1"/>
+          </p:cNvSpPr>
+          <p:nvPr>
+            <p:ph type="sldImg"/>
+          </p:nvPr>
+        </p:nvSpPr>
+        <p:spPr/>
+      </p:sp>
+      <p:sp>
+        <p:nvSpPr>
+          <p:cNvPr id="3" name="Notes Placeholder 2"/>
+          <p:cNvSpPr>
+            <a:spLocks noGrp="1"/>
+          </p:cNvSpPr>
+          <p:nvPr>
+            <p:ph type="body" idx="1"/>
+          </p:nvPr>
+        </p:nvSpPr>
+        <p:spPr/>
+        <p:txBody>
+          <a:bodyPr/>
+          <a:lstStyle/>
+          <a:p>
+            <a:r>
+              <a:rPr lang="en-US" dirty="0"/>
+              <a:t>CC:  I LOVE THIS!!! </a:t>
+            </a:r>
+            <a:r>
+              <a:rPr lang="en-US" dirty="0">
+                <a:sym typeface="Wingdings" pitchFamily="2" charset="2"/>
+              </a:rPr>
+              <a:t>  </a:t>
+            </a:r>
+            <a:endParaRPr lang="en-US" dirty="0"/>
+          </a:p>
+        </p:txBody>
+      </p:sp>
+      <p:sp>
+        <p:nvSpPr>
+          <p:cNvPr id="4" name="Slide Number Placeholder 3"/>
+          <p:cNvSpPr>
+            <a:spLocks noGrp="1"/>
+          </p:cNvSpPr>
+          <p:nvPr>
+            <p:ph type="sldNum" sz="quarter" idx="5"/>
+          </p:nvPr>
+        </p:nvSpPr>
+        <p:spPr/>
+        <p:txBody>
+          <a:bodyPr/>
+          <a:lstStyle/>
+          <a:p>
+            <a:fld id="{0A1D361F-B9A5-4658-B8D3-6D7CE0425BEB}" type="slidenum">
+              <a:rPr lang="en-US" smtClean="0"/>
+              <a:t>10</a:t>
+            </a:fld>
+            <a:endParaRPr lang="en-US"/>
+          </a:p>
+        </p:txBody>
+      </p:sp>
+    </p:spTree>
+    <p:extLst>
+      <p:ext uri="{BB962C8B-B14F-4D97-AF65-F5344CB8AC3E}">
+        <p14:creationId xmlns:p14="http://schemas.microsoft.com/office/powerpoint/2010/main" val="764986804"/>
+      </p:ext>
+    </p:extLst>
+  </p:cSld>
+  <p:clrMapOvr>
+    <a:masterClrMapping/>
+  </p:clrMapOvr>
+</p:notes>
+</file>
+
+<file path=ppt/notesSlides/notesSlide7.xml><?xml version="1.0" encoding="utf-8"?>
+<p:notes xmlns:a="http://schemas.openxmlformats.org/drawingml/2006/main" xmlns:r="http://schemas.openxmlformats.org/officeDocument/2006/relationships" xmlns:p="http://schemas.openxmlformats.org/presentationml/2006/main">
+  <p:cSld>
+    <p:spTree>
+      <p:nvGrpSpPr>
+        <p:cNvPr id="1" name=""/>
+        <p:cNvGrpSpPr/>
+        <p:nvPr/>
+      </p:nvGrpSpPr>
+      <p:grpSpPr>
+        <a:xfrm>
+          <a:off x="0" y="0"/>
+          <a:ext cx="0" cy="0"/>
+          <a:chOff x="0" y="0"/>
+          <a:chExt cx="0" cy="0"/>
+        </a:xfrm>
+      </p:grpSpPr>
+      <p:sp>
+        <p:nvSpPr>
+          <p:cNvPr id="2" name="Slide Image Placeholder 1"/>
+          <p:cNvSpPr>
+            <a:spLocks noGrp="1" noRot="1" noChangeAspect="1"/>
+          </p:cNvSpPr>
+          <p:nvPr>
+            <p:ph type="sldImg"/>
+          </p:nvPr>
+        </p:nvSpPr>
+        <p:spPr/>
+      </p:sp>
+      <p:sp>
+        <p:nvSpPr>
+          <p:cNvPr id="3" name="Notes Placeholder 2"/>
+          <p:cNvSpPr>
+            <a:spLocks noGrp="1"/>
+          </p:cNvSpPr>
+          <p:nvPr>
+            <p:ph type="body" idx="1"/>
+          </p:nvPr>
+        </p:nvSpPr>
+        <p:spPr/>
+        <p:txBody>
+          <a:bodyPr/>
+          <a:lstStyle/>
+          <a:p>
+            <a:r>
+              <a:rPr lang="en-US" dirty="0"/>
+              <a:t>Graph image source: Darla </a:t>
+            </a:r>
+            <a:r>
+              <a:rPr lang="en-US" dirty="0" err="1"/>
+              <a:t>Maneja</a:t>
+            </a:r>
+            <a:r>
+              <a:rPr lang="en-US" dirty="0"/>
+              <a:t> https://towardsdatascience.com/how-tf-idf-works-3dbf35e568f0</a:t>
+            </a:r>
+          </a:p>
+        </p:txBody>
+      </p:sp>
+      <p:sp>
+        <p:nvSpPr>
+          <p:cNvPr id="4" name="Slide Number Placeholder 3"/>
+          <p:cNvSpPr>
+            <a:spLocks noGrp="1"/>
+          </p:cNvSpPr>
+          <p:nvPr>
+            <p:ph type="sldNum" sz="quarter" idx="5"/>
+          </p:nvPr>
+        </p:nvSpPr>
+        <p:spPr/>
+        <p:txBody>
+          <a:bodyPr/>
+          <a:lstStyle/>
+          <a:p>
+            <a:fld id="{0A1D361F-B9A5-4658-B8D3-6D7CE0425BEB}" type="slidenum">
+              <a:rPr lang="en-US" smtClean="0"/>
+              <a:t>11</a:t>
+            </a:fld>
+            <a:endParaRPr lang="en-US"/>
+          </a:p>
+        </p:txBody>
+      </p:sp>
+    </p:spTree>
+    <p:extLst>
+      <p:ext uri="{BB962C8B-B14F-4D97-AF65-F5344CB8AC3E}">
+        <p14:creationId xmlns:p14="http://schemas.microsoft.com/office/powerpoint/2010/main" val="3276173958"/>
       </p:ext>
     </p:extLst>
   </p:cSld>
@@ -998,7 +1313,7 @@
           <a:p>
             <a:fld id="{D5429CCC-02C6-4689-92C3-F4ECD53C0853}" type="datetimeFigureOut">
               <a:rPr lang="en-US" smtClean="0"/>
-              <a:t>10/19/2021</a:t>
+              <a:t>10/25/2021</a:t>
             </a:fld>
             <a:endParaRPr lang="en-US"/>
           </a:p>
@@ -1196,7 +1511,7 @@
           <a:p>
             <a:fld id="{D5429CCC-02C6-4689-92C3-F4ECD53C0853}" type="datetimeFigureOut">
               <a:rPr lang="en-US" smtClean="0"/>
-              <a:t>10/19/2021</a:t>
+              <a:t>10/25/2021</a:t>
             </a:fld>
             <a:endParaRPr lang="en-US"/>
           </a:p>
@@ -1404,7 +1719,7 @@
           <a:p>
             <a:fld id="{D5429CCC-02C6-4689-92C3-F4ECD53C0853}" type="datetimeFigureOut">
               <a:rPr lang="en-US" smtClean="0"/>
-              <a:t>10/19/2021</a:t>
+              <a:t>10/25/2021</a:t>
             </a:fld>
             <a:endParaRPr lang="en-US"/>
           </a:p>
@@ -1602,7 +1917,7 @@
           <a:p>
             <a:fld id="{D5429CCC-02C6-4689-92C3-F4ECD53C0853}" type="datetimeFigureOut">
               <a:rPr lang="en-US" smtClean="0"/>
-              <a:t>10/19/2021</a:t>
+              <a:t>10/25/2021</a:t>
             </a:fld>
             <a:endParaRPr lang="en-US"/>
           </a:p>
@@ -1877,7 +2192,7 @@
           <a:p>
             <a:fld id="{D5429CCC-02C6-4689-92C3-F4ECD53C0853}" type="datetimeFigureOut">
               <a:rPr lang="en-US" smtClean="0"/>
-              <a:t>10/19/2021</a:t>
+              <a:t>10/25/2021</a:t>
             </a:fld>
             <a:endParaRPr lang="en-US"/>
           </a:p>
@@ -2142,7 +2457,7 @@
           <a:p>
             <a:fld id="{D5429CCC-02C6-4689-92C3-F4ECD53C0853}" type="datetimeFigureOut">
               <a:rPr lang="en-US" smtClean="0"/>
-              <a:t>10/19/2021</a:t>
+              <a:t>10/25/2021</a:t>
             </a:fld>
             <a:endParaRPr lang="en-US"/>
           </a:p>
@@ -2554,7 +2869,7 @@
           <a:p>
             <a:fld id="{D5429CCC-02C6-4689-92C3-F4ECD53C0853}" type="datetimeFigureOut">
               <a:rPr lang="en-US" smtClean="0"/>
-              <a:t>10/19/2021</a:t>
+              <a:t>10/25/2021</a:t>
             </a:fld>
             <a:endParaRPr lang="en-US"/>
           </a:p>
@@ -2695,7 +3010,7 @@
           <a:p>
             <a:fld id="{D5429CCC-02C6-4689-92C3-F4ECD53C0853}" type="datetimeFigureOut">
               <a:rPr lang="en-US" smtClean="0"/>
-              <a:t>10/19/2021</a:t>
+              <a:t>10/25/2021</a:t>
             </a:fld>
             <a:endParaRPr lang="en-US"/>
           </a:p>
@@ -2808,7 +3123,7 @@
           <a:p>
             <a:fld id="{D5429CCC-02C6-4689-92C3-F4ECD53C0853}" type="datetimeFigureOut">
               <a:rPr lang="en-US" smtClean="0"/>
-              <a:t>10/19/2021</a:t>
+              <a:t>10/25/2021</a:t>
             </a:fld>
             <a:endParaRPr lang="en-US"/>
           </a:p>
@@ -3119,7 +3434,7 @@
           <a:p>
             <a:fld id="{D5429CCC-02C6-4689-92C3-F4ECD53C0853}" type="datetimeFigureOut">
               <a:rPr lang="en-US" smtClean="0"/>
-              <a:t>10/19/2021</a:t>
+              <a:t>10/25/2021</a:t>
             </a:fld>
             <a:endParaRPr lang="en-US"/>
           </a:p>
@@ -3407,7 +3722,7 @@
           <a:p>
             <a:fld id="{D5429CCC-02C6-4689-92C3-F4ECD53C0853}" type="datetimeFigureOut">
               <a:rPr lang="en-US" smtClean="0"/>
-              <a:t>10/19/2021</a:t>
+              <a:t>10/25/2021</a:t>
             </a:fld>
             <a:endParaRPr lang="en-US"/>
           </a:p>
@@ -3648,7 +3963,7 @@
           <a:p>
             <a:fld id="{D5429CCC-02C6-4689-92C3-F4ECD53C0853}" type="datetimeFigureOut">
               <a:rPr lang="en-US" smtClean="0"/>
-              <a:t>10/19/2021</a:t>
+              <a:t>10/25/2021</a:t>
             </a:fld>
             <a:endParaRPr lang="en-US"/>
           </a:p>
@@ -4180,6 +4495,578 @@
           <a:chExt cx="0" cy="0"/>
         </a:xfrm>
       </p:grpSpPr>
+      <p:pic>
+        <p:nvPicPr>
+          <p:cNvPr id="5" name="Picture 4" descr="A picture containing timeline&#10;&#10;Description automatically generated">
+            <a:extLst>
+              <a:ext uri="{FF2B5EF4-FFF2-40B4-BE49-F238E27FC236}">
+                <a16:creationId xmlns:a16="http://schemas.microsoft.com/office/drawing/2014/main" id="{4A3EC2A8-68E7-414A-8900-358624A1C6A4}"/>
+              </a:ext>
+            </a:extLst>
+          </p:cNvPr>
+          <p:cNvPicPr>
+            <a:picLocks noChangeAspect="1"/>
+          </p:cNvPicPr>
+          <p:nvPr/>
+        </p:nvPicPr>
+        <p:blipFill>
+          <a:blip r:embed="rId3">
+            <a:extLst>
+              <a:ext uri="{28A0092B-C50C-407E-A947-70E740481C1C}">
+                <a14:useLocalDpi xmlns:a14="http://schemas.microsoft.com/office/drawing/2010/main" val="0"/>
+              </a:ext>
+            </a:extLst>
+          </a:blip>
+          <a:stretch>
+            <a:fillRect/>
+          </a:stretch>
+        </p:blipFill>
+        <p:spPr>
+          <a:xfrm>
+            <a:off x="478973" y="65229"/>
+            <a:ext cx="11001828" cy="6792771"/>
+          </a:xfrm>
+          <a:prstGeom prst="rect">
+            <a:avLst/>
+          </a:prstGeom>
+        </p:spPr>
+      </p:pic>
+    </p:spTree>
+    <p:extLst>
+      <p:ext uri="{BB962C8B-B14F-4D97-AF65-F5344CB8AC3E}">
+        <p14:creationId xmlns:p14="http://schemas.microsoft.com/office/powerpoint/2010/main" val="3020076989"/>
+      </p:ext>
+    </p:extLst>
+  </p:cSld>
+  <p:clrMapOvr>
+    <a:masterClrMapping/>
+  </p:clrMapOvr>
+</p:sld>
+</file>
+
+<file path=ppt/slides/slide11.xml><?xml version="1.0" encoding="utf-8"?>
+<p:sld xmlns:a="http://schemas.openxmlformats.org/drawingml/2006/main" xmlns:r="http://schemas.openxmlformats.org/officeDocument/2006/relationships" xmlns:p="http://schemas.openxmlformats.org/presentationml/2006/main">
+  <p:cSld>
+    <p:spTree>
+      <p:nvGrpSpPr>
+        <p:cNvPr id="1" name=""/>
+        <p:cNvGrpSpPr/>
+        <p:nvPr/>
+      </p:nvGrpSpPr>
+      <p:grpSpPr>
+        <a:xfrm>
+          <a:off x="0" y="0"/>
+          <a:ext cx="0" cy="0"/>
+          <a:chOff x="0" y="0"/>
+          <a:chExt cx="0" cy="0"/>
+        </a:xfrm>
+      </p:grpSpPr>
+      <p:pic>
+        <p:nvPicPr>
+          <p:cNvPr id="7" name="Picture 6">
+            <a:extLst>
+              <a:ext uri="{FF2B5EF4-FFF2-40B4-BE49-F238E27FC236}">
+                <a16:creationId xmlns:a16="http://schemas.microsoft.com/office/drawing/2014/main" id="{91499AD9-D1D0-4F12-9D4D-6A81CE8210A3}"/>
+              </a:ext>
+            </a:extLst>
+          </p:cNvPr>
+          <p:cNvPicPr>
+            <a:picLocks noChangeAspect="1"/>
+          </p:cNvPicPr>
+          <p:nvPr/>
+        </p:nvPicPr>
+        <p:blipFill>
+          <a:blip r:embed="rId3"/>
+          <a:stretch>
+            <a:fillRect/>
+          </a:stretch>
+        </p:blipFill>
+        <p:spPr>
+          <a:xfrm>
+            <a:off x="260684" y="718562"/>
+            <a:ext cx="5467968" cy="2710438"/>
+          </a:xfrm>
+          <a:prstGeom prst="rect">
+            <a:avLst/>
+          </a:prstGeom>
+        </p:spPr>
+      </p:pic>
+      <p:pic>
+        <p:nvPicPr>
+          <p:cNvPr id="11" name="Picture 10">
+            <a:extLst>
+              <a:ext uri="{FF2B5EF4-FFF2-40B4-BE49-F238E27FC236}">
+                <a16:creationId xmlns:a16="http://schemas.microsoft.com/office/drawing/2014/main" id="{E5DDA7A9-4E53-42EB-82FA-CAEAE055A482}"/>
+              </a:ext>
+            </a:extLst>
+          </p:cNvPr>
+          <p:cNvPicPr>
+            <a:picLocks noChangeAspect="1"/>
+          </p:cNvPicPr>
+          <p:nvPr/>
+        </p:nvPicPr>
+        <p:blipFill>
+          <a:blip r:embed="rId4"/>
+          <a:stretch>
+            <a:fillRect/>
+          </a:stretch>
+        </p:blipFill>
+        <p:spPr>
+          <a:xfrm>
+            <a:off x="262230" y="3593264"/>
+            <a:ext cx="5466422" cy="3148096"/>
+          </a:xfrm>
+          <a:prstGeom prst="rect">
+            <a:avLst/>
+          </a:prstGeom>
+        </p:spPr>
+      </p:pic>
+      <p:pic>
+        <p:nvPicPr>
+          <p:cNvPr id="13" name="Picture 12">
+            <a:extLst>
+              <a:ext uri="{FF2B5EF4-FFF2-40B4-BE49-F238E27FC236}">
+                <a16:creationId xmlns:a16="http://schemas.microsoft.com/office/drawing/2014/main" id="{81D9A357-BD74-46ED-8AF3-1B4A1E60D244}"/>
+              </a:ext>
+            </a:extLst>
+          </p:cNvPr>
+          <p:cNvPicPr>
+            <a:picLocks noChangeAspect="1"/>
+          </p:cNvPicPr>
+          <p:nvPr/>
+        </p:nvPicPr>
+        <p:blipFill>
+          <a:blip r:embed="rId5"/>
+          <a:stretch>
+            <a:fillRect/>
+          </a:stretch>
+        </p:blipFill>
+        <p:spPr>
+          <a:xfrm>
+            <a:off x="7222381" y="1323354"/>
+            <a:ext cx="3956758" cy="5351713"/>
+          </a:xfrm>
+          <a:prstGeom prst="rect">
+            <a:avLst/>
+          </a:prstGeom>
+        </p:spPr>
+      </p:pic>
+      <p:pic>
+        <p:nvPicPr>
+          <p:cNvPr id="14" name="Picture 13">
+            <a:extLst>
+              <a:ext uri="{FF2B5EF4-FFF2-40B4-BE49-F238E27FC236}">
+                <a16:creationId xmlns:a16="http://schemas.microsoft.com/office/drawing/2014/main" id="{5B038055-FCF8-412D-AA3D-0B3852335C2B}"/>
+              </a:ext>
+            </a:extLst>
+          </p:cNvPr>
+          <p:cNvPicPr>
+            <a:picLocks noChangeAspect="1"/>
+          </p:cNvPicPr>
+          <p:nvPr/>
+        </p:nvPicPr>
+        <p:blipFill>
+          <a:blip r:embed="rId6"/>
+          <a:stretch>
+            <a:fillRect/>
+          </a:stretch>
+        </p:blipFill>
+        <p:spPr>
+          <a:xfrm>
+            <a:off x="5987800" y="303798"/>
+            <a:ext cx="5712225" cy="1115928"/>
+          </a:xfrm>
+          <a:prstGeom prst="rect">
+            <a:avLst/>
+          </a:prstGeom>
+        </p:spPr>
+      </p:pic>
+      <p:sp>
+        <p:nvSpPr>
+          <p:cNvPr id="17" name="TextBox 16">
+            <a:extLst>
+              <a:ext uri="{FF2B5EF4-FFF2-40B4-BE49-F238E27FC236}">
+                <a16:creationId xmlns:a16="http://schemas.microsoft.com/office/drawing/2014/main" id="{508E1419-4956-43F4-AD55-AE110E713DEE}"/>
+              </a:ext>
+            </a:extLst>
+          </p:cNvPr>
+          <p:cNvSpPr txBox="1"/>
+          <p:nvPr/>
+        </p:nvSpPr>
+        <p:spPr>
+          <a:xfrm>
+            <a:off x="163287" y="135302"/>
+            <a:ext cx="3565848" cy="461665"/>
+          </a:xfrm>
+          <a:prstGeom prst="rect">
+            <a:avLst/>
+          </a:prstGeom>
+          <a:noFill/>
+        </p:spPr>
+        <p:txBody>
+          <a:bodyPr wrap="none" rtlCol="0">
+            <a:spAutoFit/>
+          </a:bodyPr>
+          <a:lstStyle/>
+          <a:p>
+            <a:r>
+              <a:rPr lang="en-US" sz="2400" dirty="0"/>
+              <a:t>Why use logarithmic scale?</a:t>
+            </a:r>
+          </a:p>
+        </p:txBody>
+      </p:sp>
+    </p:spTree>
+    <p:extLst>
+      <p:ext uri="{BB962C8B-B14F-4D97-AF65-F5344CB8AC3E}">
+        <p14:creationId xmlns:p14="http://schemas.microsoft.com/office/powerpoint/2010/main" val="3885839530"/>
+      </p:ext>
+    </p:extLst>
+  </p:cSld>
+  <p:clrMapOvr>
+    <a:masterClrMapping/>
+  </p:clrMapOvr>
+</p:sld>
+</file>
+
+<file path=ppt/slides/slide12.xml><?xml version="1.0" encoding="utf-8"?>
+<p:sld xmlns:a="http://schemas.openxmlformats.org/drawingml/2006/main" xmlns:r="http://schemas.openxmlformats.org/officeDocument/2006/relationships" xmlns:p="http://schemas.openxmlformats.org/presentationml/2006/main">
+  <p:cSld>
+    <p:spTree>
+      <p:nvGrpSpPr>
+        <p:cNvPr id="1" name=""/>
+        <p:cNvGrpSpPr/>
+        <p:nvPr/>
+      </p:nvGrpSpPr>
+      <p:grpSpPr>
+        <a:xfrm>
+          <a:off x="0" y="0"/>
+          <a:ext cx="0" cy="0"/>
+          <a:chOff x="0" y="0"/>
+          <a:chExt cx="0" cy="0"/>
+        </a:xfrm>
+      </p:grpSpPr>
+      <p:sp>
+        <p:nvSpPr>
+          <p:cNvPr id="2" name="Title 1">
+            <a:extLst>
+              <a:ext uri="{FF2B5EF4-FFF2-40B4-BE49-F238E27FC236}">
+                <a16:creationId xmlns:a16="http://schemas.microsoft.com/office/drawing/2014/main" id="{5DF4AB95-2D4D-410B-A627-8FC9A1DE340C}"/>
+              </a:ext>
+            </a:extLst>
+          </p:cNvPr>
+          <p:cNvSpPr>
+            <a:spLocks noGrp="1"/>
+          </p:cNvSpPr>
+          <p:nvPr>
+            <p:ph type="title"/>
+          </p:nvPr>
+        </p:nvSpPr>
+        <p:spPr/>
+        <p:txBody>
+          <a:bodyPr/>
+          <a:lstStyle/>
+          <a:p>
+            <a:r>
+              <a:rPr lang="en-US" b="1" dirty="0"/>
+              <a:t>Examples of the (many) applications of tf-idf </a:t>
+            </a:r>
+          </a:p>
+        </p:txBody>
+      </p:sp>
+      <p:sp>
+        <p:nvSpPr>
+          <p:cNvPr id="3" name="Content Placeholder 2">
+            <a:extLst>
+              <a:ext uri="{FF2B5EF4-FFF2-40B4-BE49-F238E27FC236}">
+                <a16:creationId xmlns:a16="http://schemas.microsoft.com/office/drawing/2014/main" id="{6391D275-D941-4D62-9B26-48B9B10C6507}"/>
+              </a:ext>
+            </a:extLst>
+          </p:cNvPr>
+          <p:cNvSpPr>
+            <a:spLocks noGrp="1"/>
+          </p:cNvSpPr>
+          <p:nvPr>
+            <p:ph idx="1"/>
+          </p:nvPr>
+        </p:nvSpPr>
+        <p:spPr/>
+        <p:txBody>
+          <a:bodyPr>
+            <a:normAutofit/>
+          </a:bodyPr>
+          <a:lstStyle/>
+          <a:p>
+            <a:r>
+              <a:rPr lang="en-US" dirty="0"/>
+              <a:t>Medical categorization tasks from clinical notes text data</a:t>
+            </a:r>
+            <a:r>
+              <a:rPr lang="en-US" baseline="30000" dirty="0"/>
+              <a:t>4</a:t>
+            </a:r>
+          </a:p>
+          <a:p>
+            <a:r>
+              <a:rPr lang="en-US" dirty="0"/>
+              <a:t>Evaluating key words in customer reviews (High vs Low ratings)</a:t>
+            </a:r>
+            <a:r>
+              <a:rPr lang="en-US" baseline="30000" dirty="0"/>
+              <a:t>5</a:t>
+            </a:r>
+          </a:p>
+          <a:p>
+            <a:r>
+              <a:rPr lang="en-US" dirty="0"/>
+              <a:t>Flu detection from Twitter text data</a:t>
+            </a:r>
+            <a:r>
+              <a:rPr lang="en-US" baseline="30000" dirty="0"/>
+              <a:t>6</a:t>
+            </a:r>
+            <a:r>
+              <a:rPr lang="en-US" dirty="0"/>
+              <a:t> </a:t>
+            </a:r>
+            <a:endParaRPr lang="en-US" baseline="30000" dirty="0"/>
+          </a:p>
+          <a:p>
+            <a:r>
+              <a:rPr lang="en-US" dirty="0"/>
+              <a:t>Exploring lateral genetic transfer among microbial genomes</a:t>
+            </a:r>
+            <a:r>
+              <a:rPr lang="en-US" baseline="30000" dirty="0"/>
+              <a:t>7</a:t>
+            </a:r>
+          </a:p>
+          <a:p>
+            <a:r>
+              <a:rPr lang="en-US" dirty="0"/>
+              <a:t>Can be transformed as odds ratios for words appearing in different collections</a:t>
+            </a:r>
+            <a:r>
+              <a:rPr lang="en-US" baseline="30000" dirty="0"/>
+              <a:t>8 </a:t>
+            </a:r>
+          </a:p>
+          <a:p>
+            <a:r>
+              <a:rPr lang="en-US" dirty="0"/>
+              <a:t>Identifying misinformation and fake news</a:t>
+            </a:r>
+            <a:r>
+              <a:rPr lang="en-US" baseline="30000" dirty="0"/>
+              <a:t>9</a:t>
+            </a:r>
+          </a:p>
+          <a:p>
+            <a:pPr marL="0" indent="0">
+              <a:buNone/>
+            </a:pPr>
+            <a:endParaRPr lang="en-US" baseline="30000" dirty="0"/>
+          </a:p>
+        </p:txBody>
+      </p:sp>
+    </p:spTree>
+    <p:extLst>
+      <p:ext uri="{BB962C8B-B14F-4D97-AF65-F5344CB8AC3E}">
+        <p14:creationId xmlns:p14="http://schemas.microsoft.com/office/powerpoint/2010/main" val="2557264850"/>
+      </p:ext>
+    </p:extLst>
+  </p:cSld>
+  <p:clrMapOvr>
+    <a:masterClrMapping/>
+  </p:clrMapOvr>
+</p:sld>
+</file>
+
+<file path=ppt/slides/slide13.xml><?xml version="1.0" encoding="utf-8"?>
+<p:sld xmlns:a="http://schemas.openxmlformats.org/drawingml/2006/main" xmlns:r="http://schemas.openxmlformats.org/officeDocument/2006/relationships" xmlns:p="http://schemas.openxmlformats.org/presentationml/2006/main">
+  <p:cSld>
+    <p:spTree>
+      <p:nvGrpSpPr>
+        <p:cNvPr id="1" name=""/>
+        <p:cNvGrpSpPr/>
+        <p:nvPr/>
+      </p:nvGrpSpPr>
+      <p:grpSpPr>
+        <a:xfrm>
+          <a:off x="0" y="0"/>
+          <a:ext cx="0" cy="0"/>
+          <a:chOff x="0" y="0"/>
+          <a:chExt cx="0" cy="0"/>
+        </a:xfrm>
+      </p:grpSpPr>
+      <p:pic>
+        <p:nvPicPr>
+          <p:cNvPr id="5" name="Picture 4">
+            <a:extLst>
+              <a:ext uri="{FF2B5EF4-FFF2-40B4-BE49-F238E27FC236}">
+                <a16:creationId xmlns:a16="http://schemas.microsoft.com/office/drawing/2014/main" id="{FFEC47B8-CA06-40E7-A65E-B5B4C3635213}"/>
+              </a:ext>
+            </a:extLst>
+          </p:cNvPr>
+          <p:cNvPicPr>
+            <a:picLocks noChangeAspect="1"/>
+          </p:cNvPicPr>
+          <p:nvPr/>
+        </p:nvPicPr>
+        <p:blipFill>
+          <a:blip r:embed="rId2">
+            <a:extLst>
+              <a:ext uri="{28A0092B-C50C-407E-A947-70E740481C1C}">
+                <a14:useLocalDpi xmlns:a14="http://schemas.microsoft.com/office/drawing/2010/main" val="0"/>
+              </a:ext>
+            </a:extLst>
+          </a:blip>
+          <a:stretch>
+            <a:fillRect/>
+          </a:stretch>
+        </p:blipFill>
+        <p:spPr>
+          <a:xfrm>
+            <a:off x="7413725" y="1220787"/>
+            <a:ext cx="3995420" cy="5243513"/>
+          </a:xfrm>
+          <a:prstGeom prst="rect">
+            <a:avLst/>
+          </a:prstGeom>
+        </p:spPr>
+      </p:pic>
+      <p:sp>
+        <p:nvSpPr>
+          <p:cNvPr id="6" name="TextBox 5">
+            <a:extLst>
+              <a:ext uri="{FF2B5EF4-FFF2-40B4-BE49-F238E27FC236}">
+                <a16:creationId xmlns:a16="http://schemas.microsoft.com/office/drawing/2014/main" id="{16B0D076-EBEC-4E7C-AE53-F2B5B22CA4D3}"/>
+              </a:ext>
+            </a:extLst>
+          </p:cNvPr>
+          <p:cNvSpPr txBox="1"/>
+          <p:nvPr/>
+        </p:nvSpPr>
+        <p:spPr>
+          <a:xfrm>
+            <a:off x="957264" y="1951672"/>
+            <a:ext cx="5300662" cy="2523768"/>
+          </a:xfrm>
+          <a:prstGeom prst="rect">
+            <a:avLst/>
+          </a:prstGeom>
+          <a:noFill/>
+        </p:spPr>
+        <p:txBody>
+          <a:bodyPr wrap="square" rtlCol="0">
+            <a:spAutoFit/>
+          </a:bodyPr>
+          <a:lstStyle/>
+          <a:p>
+            <a:r>
+              <a:rPr lang="en-US" sz="2800" dirty="0"/>
+              <a:t>Text Mining with R by </a:t>
+            </a:r>
+          </a:p>
+          <a:p>
+            <a:r>
+              <a:rPr lang="en-US" sz="2800" dirty="0"/>
+              <a:t>Julia </a:t>
+            </a:r>
+            <a:r>
+              <a:rPr lang="en-US" sz="2800" dirty="0" err="1"/>
+              <a:t>Silge</a:t>
+            </a:r>
+            <a:r>
+              <a:rPr lang="en-US" sz="2800" dirty="0"/>
+              <a:t> and David Robinson</a:t>
+            </a:r>
+          </a:p>
+          <a:p>
+            <a:endParaRPr lang="en-US" sz="2800" dirty="0"/>
+          </a:p>
+          <a:p>
+            <a:r>
+              <a:rPr lang="en-US" sz="2800" dirty="0">
+                <a:hlinkClick r:id="rId3"/>
+              </a:rPr>
+              <a:t>https://www.tidytextmining.com/</a:t>
+            </a:r>
+            <a:endParaRPr lang="en-US" sz="2800" dirty="0"/>
+          </a:p>
+          <a:p>
+            <a:endParaRPr lang="en-US" sz="2800" dirty="0"/>
+          </a:p>
+          <a:p>
+            <a:endParaRPr lang="en-US" dirty="0"/>
+          </a:p>
+        </p:txBody>
+      </p:sp>
+      <p:sp>
+        <p:nvSpPr>
+          <p:cNvPr id="7" name="TextBox 6">
+            <a:extLst>
+              <a:ext uri="{FF2B5EF4-FFF2-40B4-BE49-F238E27FC236}">
+                <a16:creationId xmlns:a16="http://schemas.microsoft.com/office/drawing/2014/main" id="{C76D5CA2-EFB0-42AB-A0AE-40D802F71EA5}"/>
+              </a:ext>
+            </a:extLst>
+          </p:cNvPr>
+          <p:cNvSpPr txBox="1"/>
+          <p:nvPr/>
+        </p:nvSpPr>
+        <p:spPr>
+          <a:xfrm>
+            <a:off x="739413" y="585788"/>
+            <a:ext cx="4038863" cy="769441"/>
+          </a:xfrm>
+          <a:prstGeom prst="rect">
+            <a:avLst/>
+          </a:prstGeom>
+          <a:noFill/>
+        </p:spPr>
+        <p:txBody>
+          <a:bodyPr wrap="none" rtlCol="0">
+            <a:spAutoFit/>
+          </a:bodyPr>
+          <a:lstStyle/>
+          <a:p>
+            <a:r>
+              <a:rPr lang="en-US" sz="4400" dirty="0"/>
+              <a:t>Further reading: </a:t>
+            </a:r>
+          </a:p>
+        </p:txBody>
+      </p:sp>
+    </p:spTree>
+    <p:extLst>
+      <p:ext uri="{BB962C8B-B14F-4D97-AF65-F5344CB8AC3E}">
+        <p14:creationId xmlns:p14="http://schemas.microsoft.com/office/powerpoint/2010/main" val="2108982129"/>
+      </p:ext>
+    </p:extLst>
+  </p:cSld>
+  <p:clrMapOvr>
+    <a:masterClrMapping/>
+  </p:clrMapOvr>
+</p:sld>
+</file>
+
+<file path=ppt/slides/slide14.xml><?xml version="1.0" encoding="utf-8"?>
+<p:sld xmlns:a="http://schemas.openxmlformats.org/drawingml/2006/main" xmlns:r="http://schemas.openxmlformats.org/officeDocument/2006/relationships" xmlns:p="http://schemas.openxmlformats.org/presentationml/2006/main">
+  <p:cSld>
+    <p:spTree>
+      <p:nvGrpSpPr>
+        <p:cNvPr id="1" name=""/>
+        <p:cNvGrpSpPr/>
+        <p:nvPr/>
+      </p:nvGrpSpPr>
+      <p:grpSpPr>
+        <a:xfrm>
+          <a:off x="0" y="0"/>
+          <a:ext cx="0" cy="0"/>
+          <a:chOff x="0" y="0"/>
+          <a:chExt cx="0" cy="0"/>
+        </a:xfrm>
+      </p:grpSpPr>
       <p:sp>
         <p:nvSpPr>
           <p:cNvPr id="2" name="Title 1">
@@ -4678,7 +5565,7 @@
           <p:cNvPr id="2" name="Title 1">
             <a:extLst>
               <a:ext uri="{FF2B5EF4-FFF2-40B4-BE49-F238E27FC236}">
-                <a16:creationId xmlns:a16="http://schemas.microsoft.com/office/drawing/2014/main" id="{65CFDC93-E53E-4138-97FF-85A411E992E5}"/>
+                <a16:creationId xmlns:a16="http://schemas.microsoft.com/office/drawing/2014/main" id="{F15BE41A-8E30-47B9-AA41-F039E6D3F43B}"/>
               </a:ext>
             </a:extLst>
           </p:cNvPr>
@@ -4696,130 +5583,139 @@
           <a:p>
             <a:r>
               <a:rPr lang="en-US" dirty="0"/>
-              <a:t>Term frequency – inverse document frequency (tf-idf)</a:t>
-            </a:r>
-          </a:p>
-        </p:txBody>
-      </p:sp>
-      <p:pic>
-        <p:nvPicPr>
-          <p:cNvPr id="7" name="Content Placeholder 6" descr="Picture of Karen Sparck Jones, creator of tf-idf, smiling to the left, lookin fly. ">
-            <a:extLst>
-              <a:ext uri="{FF2B5EF4-FFF2-40B4-BE49-F238E27FC236}">
-                <a16:creationId xmlns:a16="http://schemas.microsoft.com/office/drawing/2014/main" id="{5BB29DA9-9A06-4C2A-8E73-579B8BC4480C}"/>
-              </a:ext>
-            </a:extLst>
-          </p:cNvPr>
-          <p:cNvPicPr>
-            <a:picLocks noGrp="1" noChangeAspect="1"/>
-          </p:cNvPicPr>
+              <a:t>By the end of this lesson, we’ll be able to</a:t>
+            </a:r>
+          </a:p>
+        </p:txBody>
+      </p:sp>
+      <p:sp>
+        <p:nvSpPr>
+          <p:cNvPr id="3" name="Content Placeholder 2">
+            <a:extLst>
+              <a:ext uri="{FF2B5EF4-FFF2-40B4-BE49-F238E27FC236}">
+                <a16:creationId xmlns:a16="http://schemas.microsoft.com/office/drawing/2014/main" id="{B2EB2BFE-1137-4CB6-8FC9-866DEC7C193C}"/>
+              </a:ext>
+            </a:extLst>
+          </p:cNvPr>
+          <p:cNvSpPr>
+            <a:spLocks noGrp="1"/>
+          </p:cNvSpPr>
           <p:nvPr>
             <p:ph idx="1"/>
           </p:nvPr>
-        </p:nvPicPr>
-        <p:blipFill>
-          <a:blip r:embed="rId2">
-            <a:extLst>
-              <a:ext uri="{28A0092B-C50C-407E-A947-70E740481C1C}">
-                <a14:useLocalDpi xmlns:a14="http://schemas.microsoft.com/office/drawing/2010/main" val="0"/>
-              </a:ext>
-            </a:extLst>
-          </a:blip>
-          <a:stretch>
-            <a:fillRect/>
-          </a:stretch>
-        </p:blipFill>
-        <p:spPr>
-          <a:xfrm>
-            <a:off x="8817429" y="1480225"/>
-            <a:ext cx="2876116" cy="3515255"/>
-          </a:xfrm>
-        </p:spPr>
-      </p:pic>
-      <p:sp>
-        <p:nvSpPr>
-          <p:cNvPr id="9" name="TextBox 8">
-            <a:extLst>
-              <a:ext uri="{FF2B5EF4-FFF2-40B4-BE49-F238E27FC236}">
-                <a16:creationId xmlns:a16="http://schemas.microsoft.com/office/drawing/2014/main" id="{29BAC21E-FB5E-42F4-A104-7521958E3984}"/>
-              </a:ext>
-            </a:extLst>
-          </p:cNvPr>
-          <p:cNvSpPr txBox="1"/>
-          <p:nvPr/>
-        </p:nvSpPr>
-        <p:spPr>
-          <a:xfrm>
-            <a:off x="697830" y="2295126"/>
-            <a:ext cx="7282543" cy="3693319"/>
-          </a:xfrm>
-          <a:prstGeom prst="rect">
-            <a:avLst/>
-          </a:prstGeom>
-          <a:noFill/>
-        </p:spPr>
-        <p:txBody>
-          <a:bodyPr wrap="square" rtlCol="0">
-            <a:spAutoFit/>
-          </a:bodyPr>
-          <a:lstStyle/>
-          <a:p>
-            <a:pPr marL="285750" indent="-285750">
-              <a:buFont typeface="Arial" panose="020B0604020202020204" pitchFamily="34" charset="0"/>
-              <a:buChar char="•"/>
+        </p:nvSpPr>
+        <p:spPr/>
+        <p:txBody>
+          <a:bodyPr/>
+          <a:lstStyle/>
+          <a:p>
+            <a:pPr marL="0" marR="0">
+              <a:spcBef>
+                <a:spcPts val="0"/>
+              </a:spcBef>
+              <a:spcAft>
+                <a:spcPts val="0"/>
+              </a:spcAft>
             </a:pPr>
             <a:r>
-              <a:rPr lang="en-US" sz="2400" dirty="0"/>
-              <a:t>Developed in 1972 paper by Dr. Karen Spärck</a:t>
-            </a:r>
-            <a:r>
-              <a:rPr lang="en-US" sz="2400" b="1" dirty="0"/>
-              <a:t> </a:t>
-            </a:r>
-            <a:r>
-              <a:rPr lang="en-US" sz="2400" dirty="0"/>
-              <a:t>Jones, pioneer for computational linguistics</a:t>
-            </a:r>
-            <a:r>
-              <a:rPr lang="en-US" sz="2400" baseline="30000" dirty="0"/>
-              <a:t>1</a:t>
-            </a:r>
-          </a:p>
-          <a:p>
-            <a:pPr marL="285750" indent="-285750">
-              <a:buFont typeface="Arial" panose="020B0604020202020204" pitchFamily="34" charset="0"/>
-              <a:buChar char="•"/>
+              <a:rPr lang="en-US" dirty="0">
+                <a:effectLst/>
+                <a:latin typeface="Times New Roman" panose="02020603050405020304" pitchFamily="18" charset="0"/>
+                <a:ea typeface="Calibri" panose="020F0502020204030204" pitchFamily="34" charset="0"/>
+                <a:cs typeface="Times New Roman" panose="02020603050405020304" pitchFamily="18" charset="0"/>
+              </a:rPr>
+              <a:t>Explain in plain terms the term frequency-inverse document frequency method of analyzing text data. </a:t>
+            </a:r>
+            <a:endParaRPr lang="en-US" dirty="0">
+              <a:effectLst/>
+              <a:latin typeface="Calibri" panose="020F0502020204030204" pitchFamily="34" charset="0"/>
+              <a:ea typeface="Calibri" panose="020F0502020204030204" pitchFamily="34" charset="0"/>
+              <a:cs typeface="Times New Roman" panose="02020603050405020304" pitchFamily="18" charset="0"/>
+            </a:endParaRPr>
+          </a:p>
+          <a:p>
+            <a:pPr marL="0" marR="0">
+              <a:spcBef>
+                <a:spcPts val="0"/>
+              </a:spcBef>
+              <a:spcAft>
+                <a:spcPts val="0"/>
+              </a:spcAft>
             </a:pPr>
-            <a:endParaRPr lang="en-US" sz="2400" dirty="0"/>
-          </a:p>
-          <a:p>
-            <a:pPr marL="285750" indent="-285750">
-              <a:buFont typeface="Arial" panose="020B0604020202020204" pitchFamily="34" charset="0"/>
-              <a:buChar char="•"/>
+            <a:endParaRPr lang="en-US" dirty="0">
+              <a:effectLst/>
+              <a:latin typeface="Times New Roman" panose="02020603050405020304" pitchFamily="18" charset="0"/>
+              <a:ea typeface="Calibri" panose="020F0502020204030204" pitchFamily="34" charset="0"/>
+              <a:cs typeface="Times New Roman" panose="02020603050405020304" pitchFamily="18" charset="0"/>
+            </a:endParaRPr>
+          </a:p>
+          <a:p>
+            <a:pPr marL="0" marR="0">
+              <a:spcBef>
+                <a:spcPts val="0"/>
+              </a:spcBef>
+              <a:spcAft>
+                <a:spcPts val="0"/>
+              </a:spcAft>
             </a:pPr>
             <a:r>
-              <a:rPr lang="en-US" sz="2400" dirty="0"/>
-              <a:t>Foundation for many (estimated over 80%) modern search engine and information retrieval systems </a:t>
-            </a:r>
-          </a:p>
-          <a:p>
-            <a:endParaRPr lang="en-US" sz="2400" dirty="0"/>
-          </a:p>
-          <a:p>
-            <a:pPr marL="285750" indent="-285750">
-              <a:buFont typeface="Arial" panose="020B0604020202020204" pitchFamily="34" charset="0"/>
-              <a:buChar char="•"/>
+              <a:rPr lang="en-US" dirty="0">
+                <a:effectLst/>
+                <a:latin typeface="Times New Roman" panose="02020603050405020304" pitchFamily="18" charset="0"/>
+                <a:ea typeface="Calibri" panose="020F0502020204030204" pitchFamily="34" charset="0"/>
+                <a:cs typeface="Times New Roman" panose="02020603050405020304" pitchFamily="18" charset="0"/>
+              </a:rPr>
+              <a:t>Describe appropriate applications of tf-idf to multidisciplinary real-world research and analytic solutions.</a:t>
+            </a:r>
+            <a:endParaRPr lang="en-US" dirty="0">
+              <a:effectLst/>
+              <a:latin typeface="Calibri" panose="020F0502020204030204" pitchFamily="34" charset="0"/>
+              <a:ea typeface="Calibri" panose="020F0502020204030204" pitchFamily="34" charset="0"/>
+              <a:cs typeface="Times New Roman" panose="02020603050405020304" pitchFamily="18" charset="0"/>
+            </a:endParaRPr>
+          </a:p>
+          <a:p>
+            <a:pPr marL="0" marR="0">
+              <a:spcBef>
+                <a:spcPts val="0"/>
+              </a:spcBef>
+              <a:spcAft>
+                <a:spcPts val="0"/>
+              </a:spcAft>
             </a:pPr>
-            <a:r>
-              <a:rPr lang="en-US" sz="2400" dirty="0"/>
-              <a:t>Term-frequency inverse document frequency is all about identifying the key words, or “word specificity” in different sets of documents. </a:t>
-            </a:r>
-          </a:p>
-          <a:p>
-            <a:pPr marL="285750" indent="-285750">
-              <a:buFont typeface="Arial" panose="020B0604020202020204" pitchFamily="34" charset="0"/>
-              <a:buChar char="•"/>
+            <a:endParaRPr lang="en-US" dirty="0">
+              <a:effectLst/>
+              <a:latin typeface="Times New Roman" panose="02020603050405020304" pitchFamily="18" charset="0"/>
+              <a:ea typeface="Calibri" panose="020F0502020204030204" pitchFamily="34" charset="0"/>
+              <a:cs typeface="Times New Roman" panose="02020603050405020304" pitchFamily="18" charset="0"/>
+            </a:endParaRPr>
+          </a:p>
+          <a:p>
+            <a:pPr marL="0" marR="0">
+              <a:spcBef>
+                <a:spcPts val="0"/>
+              </a:spcBef>
+              <a:spcAft>
+                <a:spcPts val="0"/>
+              </a:spcAft>
             </a:pPr>
+            <a:r>
+              <a:rPr lang="en-US" dirty="0">
+                <a:effectLst/>
+                <a:latin typeface="Times New Roman" panose="02020603050405020304" pitchFamily="18" charset="0"/>
+                <a:ea typeface="Calibri" panose="020F0502020204030204" pitchFamily="34" charset="0"/>
+                <a:cs typeface="Times New Roman" panose="02020603050405020304" pitchFamily="18" charset="0"/>
+              </a:rPr>
+              <a:t>Understand how to incorporate code examples of tf-idf analysis in R for our own research projects </a:t>
+            </a:r>
+            <a:endParaRPr lang="en-US" dirty="0">
+              <a:effectLst/>
+              <a:latin typeface="Calibri" panose="020F0502020204030204" pitchFamily="34" charset="0"/>
+              <a:ea typeface="Calibri" panose="020F0502020204030204" pitchFamily="34" charset="0"/>
+              <a:cs typeface="Times New Roman" panose="02020603050405020304" pitchFamily="18" charset="0"/>
+            </a:endParaRPr>
+          </a:p>
+          <a:p>
             <a:endParaRPr lang="en-US" dirty="0"/>
           </a:p>
         </p:txBody>
@@ -4827,7 +5723,7 @@
     </p:spTree>
     <p:extLst>
       <p:ext uri="{BB962C8B-B14F-4D97-AF65-F5344CB8AC3E}">
-        <p14:creationId xmlns:p14="http://schemas.microsoft.com/office/powerpoint/2010/main" val="2109415491"/>
+        <p14:creationId xmlns:p14="http://schemas.microsoft.com/office/powerpoint/2010/main" val="1353722718"/>
       </p:ext>
     </p:extLst>
   </p:cSld>
@@ -4854,45 +5750,43 @@
           <a:chExt cx="0" cy="0"/>
         </a:xfrm>
       </p:grpSpPr>
-      <p:pic>
-        <p:nvPicPr>
-          <p:cNvPr id="5" name="Content Placeholder 4">
-            <a:extLst>
-              <a:ext uri="{FF2B5EF4-FFF2-40B4-BE49-F238E27FC236}">
-                <a16:creationId xmlns:a16="http://schemas.microsoft.com/office/drawing/2014/main" id="{71F42347-6E32-4D79-B3EC-E580519C37B3}"/>
-              </a:ext>
-            </a:extLst>
-          </p:cNvPr>
-          <p:cNvPicPr>
-            <a:picLocks noGrp="1" noChangeAspect="1"/>
-          </p:cNvPicPr>
-          <p:nvPr>
-            <p:ph idx="1"/>
-          </p:nvPr>
-        </p:nvPicPr>
-        <p:blipFill>
-          <a:blip r:embed="rId3">
-            <a:extLst>
-              <a:ext uri="{28A0092B-C50C-407E-A947-70E740481C1C}">
-                <a14:useLocalDpi xmlns:a14="http://schemas.microsoft.com/office/drawing/2010/main" val="0"/>
-              </a:ext>
-            </a:extLst>
-          </a:blip>
-          <a:stretch>
-            <a:fillRect/>
-          </a:stretch>
-        </p:blipFill>
+      <p:sp>
+        <p:nvSpPr>
+          <p:cNvPr id="2" name="Title 1">
+            <a:extLst>
+              <a:ext uri="{FF2B5EF4-FFF2-40B4-BE49-F238E27FC236}">
+                <a16:creationId xmlns:a16="http://schemas.microsoft.com/office/drawing/2014/main" id="{B4DC2F80-2809-4FA3-BEC6-80682C8CA70D}"/>
+              </a:ext>
+            </a:extLst>
+          </p:cNvPr>
+          <p:cNvSpPr>
+            <a:spLocks noGrp="1"/>
+          </p:cNvSpPr>
+          <p:nvPr>
+            <p:ph type="title"/>
+          </p:nvPr>
+        </p:nvSpPr>
         <p:spPr>
           <a:xfrm>
-            <a:off x="1176866" y="661987"/>
-            <a:ext cx="9838267" cy="5534025"/>
+            <a:off x="838200" y="2422525"/>
+            <a:ext cx="10515600" cy="1325563"/>
           </a:xfrm>
         </p:spPr>
-      </p:pic>
+        <p:txBody>
+          <a:bodyPr/>
+          <a:lstStyle/>
+          <a:p>
+            <a:r>
+              <a:rPr lang="en-US" dirty="0"/>
+              <a:t>Based on frequency alone, what are the most common words we read, speak, or hear?</a:t>
+            </a:r>
+          </a:p>
+        </p:txBody>
+      </p:sp>
     </p:spTree>
     <p:extLst>
       <p:ext uri="{BB962C8B-B14F-4D97-AF65-F5344CB8AC3E}">
-        <p14:creationId xmlns:p14="http://schemas.microsoft.com/office/powerpoint/2010/main" val="3514822986"/>
+        <p14:creationId xmlns:p14="http://schemas.microsoft.com/office/powerpoint/2010/main" val="796002909"/>
       </p:ext>
     </p:extLst>
   </p:cSld>
@@ -4921,6 +5815,385 @@
       </p:grpSpPr>
       <p:pic>
         <p:nvPicPr>
+          <p:cNvPr id="5" name="Picture 4">
+            <a:extLst>
+              <a:ext uri="{FF2B5EF4-FFF2-40B4-BE49-F238E27FC236}">
+                <a16:creationId xmlns:a16="http://schemas.microsoft.com/office/drawing/2014/main" id="{FC992C56-F4FE-4D3C-A143-46CD6EC93AE4}"/>
+              </a:ext>
+            </a:extLst>
+          </p:cNvPr>
+          <p:cNvPicPr>
+            <a:picLocks noChangeAspect="1"/>
+          </p:cNvPicPr>
+          <p:nvPr/>
+        </p:nvPicPr>
+        <p:blipFill>
+          <a:blip r:embed="rId3"/>
+          <a:stretch>
+            <a:fillRect/>
+          </a:stretch>
+        </p:blipFill>
+        <p:spPr>
+          <a:xfrm>
+            <a:off x="406760" y="903514"/>
+            <a:ext cx="5506792" cy="4833255"/>
+          </a:xfrm>
+          <a:prstGeom prst="rect">
+            <a:avLst/>
+          </a:prstGeom>
+        </p:spPr>
+      </p:pic>
+      <p:pic>
+        <p:nvPicPr>
+          <p:cNvPr id="1026" name="Picture 2" descr="Graphical user interface, text, application&#10;&#10;Description automatically generated">
+            <a:extLst>
+              <a:ext uri="{FF2B5EF4-FFF2-40B4-BE49-F238E27FC236}">
+                <a16:creationId xmlns:a16="http://schemas.microsoft.com/office/drawing/2014/main" id="{B129A8F5-91EA-4AFB-904C-F2469C08548D}"/>
+              </a:ext>
+            </a:extLst>
+          </p:cNvPr>
+          <p:cNvPicPr>
+            <a:picLocks noChangeAspect="1" noChangeArrowheads="1"/>
+          </p:cNvPicPr>
+          <p:nvPr/>
+        </p:nvPicPr>
+        <p:blipFill>
+          <a:blip r:embed="rId4">
+            <a:extLst>
+              <a:ext uri="{28A0092B-C50C-407E-A947-70E740481C1C}">
+                <a14:useLocalDpi xmlns:a14="http://schemas.microsoft.com/office/drawing/2010/main" val="0"/>
+              </a:ext>
+            </a:extLst>
+          </a:blip>
+          <a:srcRect/>
+          <a:stretch>
+            <a:fillRect/>
+          </a:stretch>
+        </p:blipFill>
+        <p:spPr bwMode="auto">
+          <a:xfrm>
+            <a:off x="6191365" y="2328262"/>
+            <a:ext cx="5708174" cy="1873624"/>
+          </a:xfrm>
+          <a:prstGeom prst="rect">
+            <a:avLst/>
+          </a:prstGeom>
+          <a:noFill/>
+        </p:spPr>
+      </p:pic>
+      <p:sp>
+        <p:nvSpPr>
+          <p:cNvPr id="2" name="TextBox 1">
+            <a:extLst>
+              <a:ext uri="{FF2B5EF4-FFF2-40B4-BE49-F238E27FC236}">
+                <a16:creationId xmlns:a16="http://schemas.microsoft.com/office/drawing/2014/main" id="{98F9F5A4-0ADA-44EC-B580-BBEF8C03C410}"/>
+              </a:ext>
+            </a:extLst>
+          </p:cNvPr>
+          <p:cNvSpPr txBox="1"/>
+          <p:nvPr/>
+        </p:nvSpPr>
+        <p:spPr>
+          <a:xfrm>
+            <a:off x="7787736" y="664029"/>
+            <a:ext cx="2515432" cy="707886"/>
+          </a:xfrm>
+          <a:prstGeom prst="rect">
+            <a:avLst/>
+          </a:prstGeom>
+          <a:noFill/>
+        </p:spPr>
+        <p:txBody>
+          <a:bodyPr wrap="none" rtlCol="0">
+            <a:spAutoFit/>
+          </a:bodyPr>
+          <a:lstStyle/>
+          <a:p>
+            <a:r>
+              <a:rPr lang="en-US" sz="4000" dirty="0"/>
+              <a:t>Stopwords </a:t>
+            </a:r>
+          </a:p>
+        </p:txBody>
+      </p:sp>
+    </p:spTree>
+    <p:extLst>
+      <p:ext uri="{BB962C8B-B14F-4D97-AF65-F5344CB8AC3E}">
+        <p14:creationId xmlns:p14="http://schemas.microsoft.com/office/powerpoint/2010/main" val="466869733"/>
+      </p:ext>
+    </p:extLst>
+  </p:cSld>
+  <p:clrMapOvr>
+    <a:masterClrMapping/>
+  </p:clrMapOvr>
+</p:sld>
+</file>
+
+<file path=ppt/slides/slide5.xml><?xml version="1.0" encoding="utf-8"?>
+<p:sld xmlns:a="http://schemas.openxmlformats.org/drawingml/2006/main" xmlns:r="http://schemas.openxmlformats.org/officeDocument/2006/relationships" xmlns:p="http://schemas.openxmlformats.org/presentationml/2006/main">
+  <p:cSld>
+    <p:spTree>
+      <p:nvGrpSpPr>
+        <p:cNvPr id="1" name=""/>
+        <p:cNvGrpSpPr/>
+        <p:nvPr/>
+      </p:nvGrpSpPr>
+      <p:grpSpPr>
+        <a:xfrm>
+          <a:off x="0" y="0"/>
+          <a:ext cx="0" cy="0"/>
+          <a:chOff x="0" y="0"/>
+          <a:chExt cx="0" cy="0"/>
+        </a:xfrm>
+      </p:grpSpPr>
+      <p:pic>
+        <p:nvPicPr>
+          <p:cNvPr id="5" name="Content Placeholder 4">
+            <a:extLst>
+              <a:ext uri="{FF2B5EF4-FFF2-40B4-BE49-F238E27FC236}">
+                <a16:creationId xmlns:a16="http://schemas.microsoft.com/office/drawing/2014/main" id="{71F42347-6E32-4D79-B3EC-E580519C37B3}"/>
+              </a:ext>
+            </a:extLst>
+          </p:cNvPr>
+          <p:cNvPicPr>
+            <a:picLocks noGrp="1" noChangeAspect="1"/>
+          </p:cNvPicPr>
+          <p:nvPr>
+            <p:ph idx="1"/>
+          </p:nvPr>
+        </p:nvPicPr>
+        <p:blipFill>
+          <a:blip r:embed="rId3">
+            <a:extLst>
+              <a:ext uri="{28A0092B-C50C-407E-A947-70E740481C1C}">
+                <a14:useLocalDpi xmlns:a14="http://schemas.microsoft.com/office/drawing/2010/main" val="0"/>
+              </a:ext>
+            </a:extLst>
+          </a:blip>
+          <a:stretch>
+            <a:fillRect/>
+          </a:stretch>
+        </p:blipFill>
+        <p:spPr>
+          <a:xfrm>
+            <a:off x="1176866" y="661987"/>
+            <a:ext cx="9838267" cy="5534025"/>
+          </a:xfrm>
+        </p:spPr>
+      </p:pic>
+    </p:spTree>
+    <p:extLst>
+      <p:ext uri="{BB962C8B-B14F-4D97-AF65-F5344CB8AC3E}">
+        <p14:creationId xmlns:p14="http://schemas.microsoft.com/office/powerpoint/2010/main" val="3514822986"/>
+      </p:ext>
+    </p:extLst>
+  </p:cSld>
+  <p:clrMapOvr>
+    <a:masterClrMapping/>
+  </p:clrMapOvr>
+</p:sld>
+</file>
+
+<file path=ppt/slides/slide6.xml><?xml version="1.0" encoding="utf-8"?>
+<p:sld xmlns:a="http://schemas.openxmlformats.org/drawingml/2006/main" xmlns:r="http://schemas.openxmlformats.org/officeDocument/2006/relationships" xmlns:p="http://schemas.openxmlformats.org/presentationml/2006/main">
+  <p:cSld>
+    <p:spTree>
+      <p:nvGrpSpPr>
+        <p:cNvPr id="1" name=""/>
+        <p:cNvGrpSpPr/>
+        <p:nvPr/>
+      </p:nvGrpSpPr>
+      <p:grpSpPr>
+        <a:xfrm>
+          <a:off x="0" y="0"/>
+          <a:ext cx="0" cy="0"/>
+          <a:chOff x="0" y="0"/>
+          <a:chExt cx="0" cy="0"/>
+        </a:xfrm>
+      </p:grpSpPr>
+      <p:sp>
+        <p:nvSpPr>
+          <p:cNvPr id="2" name="Title 1">
+            <a:extLst>
+              <a:ext uri="{FF2B5EF4-FFF2-40B4-BE49-F238E27FC236}">
+                <a16:creationId xmlns:a16="http://schemas.microsoft.com/office/drawing/2014/main" id="{65CFDC93-E53E-4138-97FF-85A411E992E5}"/>
+              </a:ext>
+            </a:extLst>
+          </p:cNvPr>
+          <p:cNvSpPr>
+            <a:spLocks noGrp="1"/>
+          </p:cNvSpPr>
+          <p:nvPr>
+            <p:ph type="title"/>
+          </p:nvPr>
+        </p:nvSpPr>
+        <p:spPr/>
+        <p:txBody>
+          <a:bodyPr/>
+          <a:lstStyle/>
+          <a:p>
+            <a:r>
+              <a:rPr lang="en-US" dirty="0"/>
+              <a:t>Term frequency – inverse document frequency (tf-idf)</a:t>
+            </a:r>
+          </a:p>
+        </p:txBody>
+      </p:sp>
+      <p:pic>
+        <p:nvPicPr>
+          <p:cNvPr id="7" name="Content Placeholder 6" descr="Picture of Karen Sparck Jones, creator of tf-idf, smiling to the left, lookin fly. ">
+            <a:extLst>
+              <a:ext uri="{FF2B5EF4-FFF2-40B4-BE49-F238E27FC236}">
+                <a16:creationId xmlns:a16="http://schemas.microsoft.com/office/drawing/2014/main" id="{5BB29DA9-9A06-4C2A-8E73-579B8BC4480C}"/>
+              </a:ext>
+            </a:extLst>
+          </p:cNvPr>
+          <p:cNvPicPr>
+            <a:picLocks noGrp="1" noChangeAspect="1"/>
+          </p:cNvPicPr>
+          <p:nvPr>
+            <p:ph idx="1"/>
+          </p:nvPr>
+        </p:nvPicPr>
+        <p:blipFill>
+          <a:blip r:embed="rId2">
+            <a:extLst>
+              <a:ext uri="{28A0092B-C50C-407E-A947-70E740481C1C}">
+                <a14:useLocalDpi xmlns:a14="http://schemas.microsoft.com/office/drawing/2010/main" val="0"/>
+              </a:ext>
+            </a:extLst>
+          </a:blip>
+          <a:stretch>
+            <a:fillRect/>
+          </a:stretch>
+        </p:blipFill>
+        <p:spPr>
+          <a:xfrm>
+            <a:off x="8817429" y="1480225"/>
+            <a:ext cx="2876116" cy="3515255"/>
+          </a:xfrm>
+        </p:spPr>
+      </p:pic>
+      <p:sp>
+        <p:nvSpPr>
+          <p:cNvPr id="9" name="TextBox 8">
+            <a:extLst>
+              <a:ext uri="{FF2B5EF4-FFF2-40B4-BE49-F238E27FC236}">
+                <a16:creationId xmlns:a16="http://schemas.microsoft.com/office/drawing/2014/main" id="{29BAC21E-FB5E-42F4-A104-7521958E3984}"/>
+              </a:ext>
+            </a:extLst>
+          </p:cNvPr>
+          <p:cNvSpPr txBox="1"/>
+          <p:nvPr/>
+        </p:nvSpPr>
+        <p:spPr>
+          <a:xfrm>
+            <a:off x="697830" y="2295126"/>
+            <a:ext cx="7282543" cy="3693319"/>
+          </a:xfrm>
+          <a:prstGeom prst="rect">
+            <a:avLst/>
+          </a:prstGeom>
+          <a:noFill/>
+        </p:spPr>
+        <p:txBody>
+          <a:bodyPr wrap="square" rtlCol="0">
+            <a:spAutoFit/>
+          </a:bodyPr>
+          <a:lstStyle/>
+          <a:p>
+            <a:pPr marL="285750" indent="-285750">
+              <a:buFont typeface="Arial" panose="020B0604020202020204" pitchFamily="34" charset="0"/>
+              <a:buChar char="•"/>
+            </a:pPr>
+            <a:r>
+              <a:rPr lang="en-US" sz="2400" dirty="0"/>
+              <a:t>Developed in 1972 paper by Dr. Karen Spärck</a:t>
+            </a:r>
+            <a:r>
+              <a:rPr lang="en-US" sz="2400" b="1" dirty="0"/>
+              <a:t> </a:t>
+            </a:r>
+            <a:r>
+              <a:rPr lang="en-US" sz="2400" dirty="0"/>
+              <a:t>Jones, pioneer for computational linguistics</a:t>
+            </a:r>
+            <a:r>
+              <a:rPr lang="en-US" sz="2400" baseline="30000" dirty="0"/>
+              <a:t>1</a:t>
+            </a:r>
+          </a:p>
+          <a:p>
+            <a:pPr marL="285750" indent="-285750">
+              <a:buFont typeface="Arial" panose="020B0604020202020204" pitchFamily="34" charset="0"/>
+              <a:buChar char="•"/>
+            </a:pPr>
+            <a:endParaRPr lang="en-US" sz="2400" dirty="0"/>
+          </a:p>
+          <a:p>
+            <a:pPr marL="285750" indent="-285750">
+              <a:buFont typeface="Arial" panose="020B0604020202020204" pitchFamily="34" charset="0"/>
+              <a:buChar char="•"/>
+            </a:pPr>
+            <a:r>
+              <a:rPr lang="en-US" sz="2400" dirty="0"/>
+              <a:t>Foundation for many (estimated over 80%) modern search engine and information retrieval systems </a:t>
+            </a:r>
+          </a:p>
+          <a:p>
+            <a:endParaRPr lang="en-US" sz="2400" dirty="0"/>
+          </a:p>
+          <a:p>
+            <a:pPr marL="285750" indent="-285750">
+              <a:buFont typeface="Arial" panose="020B0604020202020204" pitchFamily="34" charset="0"/>
+              <a:buChar char="•"/>
+            </a:pPr>
+            <a:r>
+              <a:rPr lang="en-US" sz="2400" dirty="0"/>
+              <a:t>Term-frequency inverse document frequency is all about identifying the key words, or “word specificity” in different sets of documents. </a:t>
+            </a:r>
+          </a:p>
+          <a:p>
+            <a:pPr marL="285750" indent="-285750">
+              <a:buFont typeface="Arial" panose="020B0604020202020204" pitchFamily="34" charset="0"/>
+              <a:buChar char="•"/>
+            </a:pPr>
+            <a:endParaRPr lang="en-US" dirty="0"/>
+          </a:p>
+        </p:txBody>
+      </p:sp>
+    </p:spTree>
+    <p:extLst>
+      <p:ext uri="{BB962C8B-B14F-4D97-AF65-F5344CB8AC3E}">
+        <p14:creationId xmlns:p14="http://schemas.microsoft.com/office/powerpoint/2010/main" val="2109415491"/>
+      </p:ext>
+    </p:extLst>
+  </p:cSld>
+  <p:clrMapOvr>
+    <a:masterClrMapping/>
+  </p:clrMapOvr>
+</p:sld>
+</file>
+
+<file path=ppt/slides/slide7.xml><?xml version="1.0" encoding="utf-8"?>
+<p:sld xmlns:a="http://schemas.openxmlformats.org/drawingml/2006/main" xmlns:r="http://schemas.openxmlformats.org/officeDocument/2006/relationships" xmlns:p="http://schemas.openxmlformats.org/presentationml/2006/main">
+  <p:cSld>
+    <p:spTree>
+      <p:nvGrpSpPr>
+        <p:cNvPr id="1" name=""/>
+        <p:cNvGrpSpPr/>
+        <p:nvPr/>
+      </p:nvGrpSpPr>
+      <p:grpSpPr>
+        <a:xfrm>
+          <a:off x="0" y="0"/>
+          <a:ext cx="0" cy="0"/>
+          <a:chOff x="0" y="0"/>
+          <a:chExt cx="0" cy="0"/>
+        </a:xfrm>
+      </p:grpSpPr>
+      <p:pic>
+        <p:nvPicPr>
           <p:cNvPr id="1026" name="Picture 2" descr="Highest tf-idf words in different physics texts from Galileo, Tesla , Huygens, Einstein. ">
             <a:extLst>
               <a:ext uri="{FF2B5EF4-FFF2-40B4-BE49-F238E27FC236}">
@@ -5101,8 +6374,6 @@
               <a:rPr lang="en-US" dirty="0"/>
               <a:t>the natural log of the ratio of number of documents/number of documents with that term. </a:t>
             </a:r>
-          </a:p>
-          <a:p>
             <a:endParaRPr lang="en-US" b="1" dirty="0"/>
           </a:p>
           <a:p>
@@ -5110,6 +6381,9 @@
               <a:rPr lang="en-US" dirty="0"/>
               <a:t>This helps us weight unique words to each document or collection, and rule out common words.</a:t>
             </a:r>
+          </a:p>
+          <a:p>
+            <a:endParaRPr lang="en-US" dirty="0"/>
           </a:p>
           <a:p>
             <a:endParaRPr lang="en-US" b="1" dirty="0"/>
@@ -5165,431 +6439,6 @@
 </p:sld>
 </file>
 
-<file path=ppt/slides/slide5.xml><?xml version="1.0" encoding="utf-8"?>
-<p:sld xmlns:a="http://schemas.openxmlformats.org/drawingml/2006/main" xmlns:r="http://schemas.openxmlformats.org/officeDocument/2006/relationships" xmlns:p="http://schemas.openxmlformats.org/presentationml/2006/main">
-  <p:cSld>
-    <p:spTree>
-      <p:nvGrpSpPr>
-        <p:cNvPr id="1" name=""/>
-        <p:cNvGrpSpPr/>
-        <p:nvPr/>
-      </p:nvGrpSpPr>
-      <p:grpSpPr>
-        <a:xfrm>
-          <a:off x="0" y="0"/>
-          <a:ext cx="0" cy="0"/>
-          <a:chOff x="0" y="0"/>
-          <a:chExt cx="0" cy="0"/>
-        </a:xfrm>
-      </p:grpSpPr>
-      <p:sp>
-        <p:nvSpPr>
-          <p:cNvPr id="3" name="Content Placeholder 2">
-            <a:extLst>
-              <a:ext uri="{FF2B5EF4-FFF2-40B4-BE49-F238E27FC236}">
-                <a16:creationId xmlns:a16="http://schemas.microsoft.com/office/drawing/2014/main" id="{4EA30148-9537-49F3-A09A-507008D346D2}"/>
-              </a:ext>
-            </a:extLst>
-          </p:cNvPr>
-          <p:cNvSpPr>
-            <a:spLocks noGrp="1"/>
-          </p:cNvSpPr>
-          <p:nvPr>
-            <p:ph idx="1"/>
-          </p:nvPr>
-        </p:nvSpPr>
-        <p:spPr>
-          <a:xfrm>
-            <a:off x="1106958" y="809519"/>
-            <a:ext cx="10380191" cy="5448406"/>
-          </a:xfrm>
-        </p:spPr>
-        <p:txBody>
-          <a:bodyPr>
-            <a:normAutofit fontScale="70000" lnSpcReduction="20000"/>
-          </a:bodyPr>
-          <a:lstStyle/>
-          <a:p>
-            <a:pPr marL="0" indent="0" algn="ctr">
-              <a:buNone/>
-            </a:pPr>
-            <a:r>
-              <a:rPr lang="en-US" sz="5400" dirty="0"/>
-              <a:t>Every field of study has it’s own shared language.</a:t>
-            </a:r>
-          </a:p>
-          <a:p>
-            <a:pPr marL="0" indent="0">
-              <a:buNone/>
-            </a:pPr>
-            <a:endParaRPr lang="en-US" sz="5400" dirty="0"/>
-          </a:p>
-          <a:p>
-            <a:pPr marL="0" indent="0">
-              <a:buNone/>
-            </a:pPr>
-            <a:endParaRPr lang="en-US" sz="5400" dirty="0"/>
-          </a:p>
-          <a:p>
-            <a:pPr marL="0" indent="0">
-              <a:buNone/>
-            </a:pPr>
-            <a:r>
-              <a:rPr lang="en-US" sz="5400" dirty="0"/>
-              <a:t>Partner up: </a:t>
-            </a:r>
-          </a:p>
-          <a:p>
-            <a:pPr marL="0" indent="0">
-              <a:buNone/>
-            </a:pPr>
-            <a:r>
-              <a:rPr lang="en-US" sz="5400" dirty="0"/>
-              <a:t>1) Introduce yourself and your dept/field of study.</a:t>
-            </a:r>
-          </a:p>
-          <a:p>
-            <a:pPr marL="0" indent="0">
-              <a:buNone/>
-            </a:pPr>
-            <a:endParaRPr lang="en-US" sz="5400" dirty="0"/>
-          </a:p>
-          <a:p>
-            <a:pPr marL="0" indent="0">
-              <a:buNone/>
-            </a:pPr>
-            <a:r>
-              <a:rPr lang="en-US" sz="5400" dirty="0"/>
-              <a:t>2) What are some of the words that are specific to your department or field of study?</a:t>
-            </a:r>
-          </a:p>
-          <a:p>
-            <a:pPr marL="0" indent="0">
-              <a:buNone/>
-            </a:pPr>
-            <a:endParaRPr lang="en-US" sz="5400" dirty="0"/>
-          </a:p>
-          <a:p>
-            <a:pPr marL="0" indent="0">
-              <a:buNone/>
-            </a:pPr>
-            <a:r>
-              <a:rPr lang="en-US" sz="5400" dirty="0"/>
-              <a:t>3) What are some words you two might share?</a:t>
-            </a:r>
-          </a:p>
-          <a:p>
-            <a:pPr marL="0" indent="0">
-              <a:buNone/>
-            </a:pPr>
-            <a:endParaRPr lang="en-US" sz="5400" dirty="0"/>
-          </a:p>
-          <a:p>
-            <a:pPr marL="0" indent="0">
-              <a:buNone/>
-            </a:pPr>
-            <a:endParaRPr lang="en-US" sz="5400" dirty="0"/>
-          </a:p>
-          <a:p>
-            <a:pPr marL="0" indent="0">
-              <a:buNone/>
-            </a:pPr>
-            <a:endParaRPr lang="en-US" sz="5400" dirty="0"/>
-          </a:p>
-        </p:txBody>
-      </p:sp>
-    </p:spTree>
-    <p:extLst>
-      <p:ext uri="{BB962C8B-B14F-4D97-AF65-F5344CB8AC3E}">
-        <p14:creationId xmlns:p14="http://schemas.microsoft.com/office/powerpoint/2010/main" val="1889349605"/>
-      </p:ext>
-    </p:extLst>
-  </p:cSld>
-  <p:clrMapOvr>
-    <a:masterClrMapping/>
-  </p:clrMapOvr>
-</p:sld>
-</file>
-
-<file path=ppt/slides/slide6.xml><?xml version="1.0" encoding="utf-8"?>
-<p:sld xmlns:a="http://schemas.openxmlformats.org/drawingml/2006/main" xmlns:r="http://schemas.openxmlformats.org/officeDocument/2006/relationships" xmlns:p="http://schemas.openxmlformats.org/presentationml/2006/main">
-  <p:cSld>
-    <p:spTree>
-      <p:nvGrpSpPr>
-        <p:cNvPr id="1" name=""/>
-        <p:cNvGrpSpPr/>
-        <p:nvPr/>
-      </p:nvGrpSpPr>
-      <p:grpSpPr>
-        <a:xfrm>
-          <a:off x="0" y="0"/>
-          <a:ext cx="0" cy="0"/>
-          <a:chOff x="0" y="0"/>
-          <a:chExt cx="0" cy="0"/>
-        </a:xfrm>
-      </p:grpSpPr>
-      <p:sp>
-        <p:nvSpPr>
-          <p:cNvPr id="2" name="Title 1">
-            <a:extLst>
-              <a:ext uri="{FF2B5EF4-FFF2-40B4-BE49-F238E27FC236}">
-                <a16:creationId xmlns:a16="http://schemas.microsoft.com/office/drawing/2014/main" id="{D0041A93-90AE-4287-8C58-163297F2FF3C}"/>
-              </a:ext>
-            </a:extLst>
-          </p:cNvPr>
-          <p:cNvSpPr>
-            <a:spLocks noGrp="1"/>
-          </p:cNvSpPr>
-          <p:nvPr>
-            <p:ph type="title"/>
-          </p:nvPr>
-        </p:nvSpPr>
-        <p:spPr/>
-        <p:txBody>
-          <a:bodyPr/>
-          <a:lstStyle/>
-          <a:p>
-            <a:r>
-              <a:rPr lang="en-US" dirty="0"/>
-              <a:t>Let’s see what this might look like! </a:t>
-            </a:r>
-          </a:p>
-        </p:txBody>
-      </p:sp>
-      <p:sp>
-        <p:nvSpPr>
-          <p:cNvPr id="3" name="Content Placeholder 2">
-            <a:extLst>
-              <a:ext uri="{FF2B5EF4-FFF2-40B4-BE49-F238E27FC236}">
-                <a16:creationId xmlns:a16="http://schemas.microsoft.com/office/drawing/2014/main" id="{8FE7FA59-A299-4AF3-92CF-0B41EDD8AB35}"/>
-              </a:ext>
-            </a:extLst>
-          </p:cNvPr>
-          <p:cNvSpPr>
-            <a:spLocks noGrp="1"/>
-          </p:cNvSpPr>
-          <p:nvPr>
-            <p:ph idx="1"/>
-          </p:nvPr>
-        </p:nvSpPr>
-        <p:spPr/>
-        <p:txBody>
-          <a:bodyPr>
-            <a:normAutofit fontScale="85000" lnSpcReduction="20000"/>
-          </a:bodyPr>
-          <a:lstStyle/>
-          <a:p>
-            <a:pPr marL="514350" indent="-514350">
-              <a:buAutoNum type="arabicPeriod"/>
-            </a:pPr>
-            <a:r>
-              <a:rPr lang="en-US" dirty="0"/>
-              <a:t>Web-scrape bios of our BSHES Faculty and PhD students (or copy-paste it </a:t>
-            </a:r>
-            <a:r>
-              <a:rPr lang="en-US" dirty="0">
-                <a:sym typeface="Wingdings" panose="05000000000000000000" pitchFamily="2" charset="2"/>
-              </a:rPr>
-              <a:t> )</a:t>
-            </a:r>
-            <a:endParaRPr lang="en-US" dirty="0"/>
-          </a:p>
-          <a:p>
-            <a:pPr marL="514350" indent="-514350">
-              <a:buAutoNum type="arabicPeriod"/>
-            </a:pPr>
-            <a:r>
-              <a:rPr lang="en-US" dirty="0"/>
-              <a:t>Read data into R</a:t>
-            </a:r>
-          </a:p>
-          <a:p>
-            <a:pPr marL="514350" indent="-514350">
-              <a:buFont typeface="Arial" panose="020B0604020202020204" pitchFamily="34" charset="0"/>
-              <a:buAutoNum type="arabicPeriod"/>
-            </a:pPr>
-            <a:r>
-              <a:rPr lang="en-US" dirty="0"/>
-              <a:t>Text pre-processing– remove punctuation, stop-words (only if you want)</a:t>
-            </a:r>
-          </a:p>
-          <a:p>
-            <a:pPr marL="514350" indent="-514350">
-              <a:buFont typeface="Arial" panose="020B0604020202020204" pitchFamily="34" charset="0"/>
-              <a:buAutoNum type="arabicPeriod"/>
-            </a:pPr>
-            <a:r>
-              <a:rPr lang="en-US" dirty="0"/>
-              <a:t>Tokenize, or break texts into words </a:t>
-            </a:r>
-          </a:p>
-          <a:p>
-            <a:pPr marL="514350" indent="-514350">
-              <a:buFont typeface="Arial" panose="020B0604020202020204" pitchFamily="34" charset="0"/>
-              <a:buAutoNum type="arabicPeriod"/>
-            </a:pPr>
-            <a:r>
-              <a:rPr lang="en-US" dirty="0"/>
-              <a:t>Count up overall totals of words in the overall corpus</a:t>
-            </a:r>
-          </a:p>
-          <a:p>
-            <a:pPr marL="514350" indent="-514350">
-              <a:buFont typeface="Arial" panose="020B0604020202020204" pitchFamily="34" charset="0"/>
-              <a:buAutoNum type="arabicPeriod"/>
-            </a:pPr>
-            <a:r>
-              <a:rPr lang="en-US" dirty="0"/>
-              <a:t>Group by name </a:t>
-            </a:r>
-          </a:p>
-          <a:p>
-            <a:pPr marL="514350" indent="-514350">
-              <a:buFont typeface="Arial" panose="020B0604020202020204" pitchFamily="34" charset="0"/>
-              <a:buAutoNum type="arabicPeriod"/>
-            </a:pPr>
-            <a:r>
-              <a:rPr lang="en-US" dirty="0"/>
-              <a:t>Total words per person</a:t>
-            </a:r>
-          </a:p>
-          <a:p>
-            <a:pPr marL="514350" indent="-514350">
-              <a:buFont typeface="Arial" panose="020B0604020202020204" pitchFamily="34" charset="0"/>
-              <a:buAutoNum type="arabicPeriod"/>
-            </a:pPr>
-            <a:r>
-              <a:rPr lang="en-US" dirty="0"/>
-              <a:t>Calculate </a:t>
-            </a:r>
-            <a:r>
-              <a:rPr lang="en-US" dirty="0" err="1"/>
-              <a:t>tf-idf</a:t>
-            </a:r>
-            <a:endParaRPr lang="en-US" dirty="0"/>
-          </a:p>
-          <a:p>
-            <a:pPr marL="514350" indent="-514350">
-              <a:buFont typeface="Arial" panose="020B0604020202020204" pitchFamily="34" charset="0"/>
-              <a:buAutoNum type="arabicPeriod"/>
-            </a:pPr>
-            <a:r>
-              <a:rPr lang="en-US" dirty="0"/>
-              <a:t>Visualize top </a:t>
-            </a:r>
-            <a:r>
-              <a:rPr lang="en-US" dirty="0" err="1"/>
-              <a:t>tf-idf</a:t>
-            </a:r>
-            <a:r>
-              <a:rPr lang="en-US" dirty="0"/>
-              <a:t> terms per person.</a:t>
-            </a:r>
-            <a:endParaRPr lang="en-US" dirty="0">
-              <a:hlinkClick r:id="rId2"/>
-            </a:endParaRPr>
-          </a:p>
-          <a:p>
-            <a:pPr marL="0" indent="0">
-              <a:buNone/>
-            </a:pPr>
-            <a:endParaRPr lang="en-US" dirty="0">
-              <a:hlinkClick r:id="rId2"/>
-            </a:endParaRPr>
-          </a:p>
-          <a:p>
-            <a:r>
-              <a:rPr lang="en-US" dirty="0">
-                <a:hlinkClick r:id="rId2"/>
-              </a:rPr>
-              <a:t>https://github.com/drew-walkerr/tf_idf_lesson</a:t>
-            </a:r>
-            <a:r>
-              <a:rPr lang="en-US" dirty="0"/>
-              <a:t> </a:t>
-            </a:r>
-          </a:p>
-        </p:txBody>
-      </p:sp>
-    </p:spTree>
-    <p:extLst>
-      <p:ext uri="{BB962C8B-B14F-4D97-AF65-F5344CB8AC3E}">
-        <p14:creationId xmlns:p14="http://schemas.microsoft.com/office/powerpoint/2010/main" val="1209700120"/>
-      </p:ext>
-    </p:extLst>
-  </p:cSld>
-  <p:clrMapOvr>
-    <a:masterClrMapping/>
-  </p:clrMapOvr>
-</p:sld>
-</file>
-
-<file path=ppt/slides/slide7.xml><?xml version="1.0" encoding="utf-8"?>
-<p:sld xmlns:a="http://schemas.openxmlformats.org/drawingml/2006/main" xmlns:r="http://schemas.openxmlformats.org/officeDocument/2006/relationships" xmlns:p="http://schemas.openxmlformats.org/presentationml/2006/main">
-  <p:cSld>
-    <p:spTree>
-      <p:nvGrpSpPr>
-        <p:cNvPr id="1" name=""/>
-        <p:cNvGrpSpPr/>
-        <p:nvPr/>
-      </p:nvGrpSpPr>
-      <p:grpSpPr>
-        <a:xfrm>
-          <a:off x="0" y="0"/>
-          <a:ext cx="0" cy="0"/>
-          <a:chOff x="0" y="0"/>
-          <a:chExt cx="0" cy="0"/>
-        </a:xfrm>
-      </p:grpSpPr>
-      <p:pic>
-        <p:nvPicPr>
-          <p:cNvPr id="5" name="Picture 4" descr="A picture containing timeline&#10;&#10;Description automatically generated">
-            <a:extLst>
-              <a:ext uri="{FF2B5EF4-FFF2-40B4-BE49-F238E27FC236}">
-                <a16:creationId xmlns:a16="http://schemas.microsoft.com/office/drawing/2014/main" id="{4A3EC2A8-68E7-414A-8900-358624A1C6A4}"/>
-              </a:ext>
-            </a:extLst>
-          </p:cNvPr>
-          <p:cNvPicPr>
-            <a:picLocks noChangeAspect="1"/>
-          </p:cNvPicPr>
-          <p:nvPr/>
-        </p:nvPicPr>
-        <p:blipFill>
-          <a:blip r:embed="rId2">
-            <a:extLst>
-              <a:ext uri="{28A0092B-C50C-407E-A947-70E740481C1C}">
-                <a14:useLocalDpi xmlns:a14="http://schemas.microsoft.com/office/drawing/2010/main" val="0"/>
-              </a:ext>
-            </a:extLst>
-          </a:blip>
-          <a:stretch>
-            <a:fillRect/>
-          </a:stretch>
-        </p:blipFill>
-        <p:spPr>
-          <a:xfrm>
-            <a:off x="478973" y="65229"/>
-            <a:ext cx="11001828" cy="6792771"/>
-          </a:xfrm>
-          <a:prstGeom prst="rect">
-            <a:avLst/>
-          </a:prstGeom>
-        </p:spPr>
-      </p:pic>
-    </p:spTree>
-    <p:extLst>
-      <p:ext uri="{BB962C8B-B14F-4D97-AF65-F5344CB8AC3E}">
-        <p14:creationId xmlns:p14="http://schemas.microsoft.com/office/powerpoint/2010/main" val="3020076989"/>
-      </p:ext>
-    </p:extLst>
-  </p:cSld>
-  <p:clrMapOvr>
-    <a:masterClrMapping/>
-  </p:clrMapOvr>
-</p:sld>
-</file>
-
 <file path=ppt/slides/slide8.xml><?xml version="1.0" encoding="utf-8"?>
 <p:sld xmlns:a="http://schemas.openxmlformats.org/drawingml/2006/main" xmlns:r="http://schemas.openxmlformats.org/officeDocument/2006/relationships" xmlns:p="http://schemas.openxmlformats.org/presentationml/2006/main">
   <p:cSld>
@@ -5609,38 +6458,10 @@
       </p:grpSpPr>
       <p:sp>
         <p:nvSpPr>
-          <p:cNvPr id="2" name="Title 1">
-            <a:extLst>
-              <a:ext uri="{FF2B5EF4-FFF2-40B4-BE49-F238E27FC236}">
-                <a16:creationId xmlns:a16="http://schemas.microsoft.com/office/drawing/2014/main" id="{5DF4AB95-2D4D-410B-A627-8FC9A1DE340C}"/>
-              </a:ext>
-            </a:extLst>
-          </p:cNvPr>
-          <p:cNvSpPr>
-            <a:spLocks noGrp="1"/>
-          </p:cNvSpPr>
-          <p:nvPr>
-            <p:ph type="title"/>
-          </p:nvPr>
-        </p:nvSpPr>
-        <p:spPr/>
-        <p:txBody>
-          <a:bodyPr/>
-          <a:lstStyle/>
-          <a:p>
-            <a:r>
-              <a:rPr lang="en-US" b="1" dirty="0"/>
-              <a:t>Examples of the (many) applications of tf-idf </a:t>
-            </a:r>
-          </a:p>
-        </p:txBody>
-      </p:sp>
-      <p:sp>
-        <p:nvSpPr>
           <p:cNvPr id="3" name="Content Placeholder 2">
             <a:extLst>
               <a:ext uri="{FF2B5EF4-FFF2-40B4-BE49-F238E27FC236}">
-                <a16:creationId xmlns:a16="http://schemas.microsoft.com/office/drawing/2014/main" id="{6391D275-D941-4D62-9B26-48B9B10C6507}"/>
+                <a16:creationId xmlns:a16="http://schemas.microsoft.com/office/drawing/2014/main" id="{4EA30148-9537-49F3-A09A-507008D346D2}"/>
               </a:ext>
             </a:extLst>
           </p:cNvPr>
@@ -5651,89 +6472,110 @@
             <p:ph idx="1"/>
           </p:nvPr>
         </p:nvSpPr>
-        <p:spPr/>
+        <p:spPr>
+          <a:xfrm>
+            <a:off x="1106958" y="809519"/>
+            <a:ext cx="10380191" cy="5448406"/>
+          </a:xfrm>
+        </p:spPr>
         <p:txBody>
           <a:bodyPr>
-            <a:normAutofit/>
+            <a:normAutofit fontScale="62500" lnSpcReduction="20000"/>
           </a:bodyPr>
           <a:lstStyle/>
           <a:p>
-            <a:r>
-              <a:rPr lang="en-US" dirty="0"/>
-              <a:t>Medical categorization tasks from clinical notes text data</a:t>
-            </a:r>
-            <a:r>
-              <a:rPr lang="en-US" baseline="30000" dirty="0"/>
-              <a:t>4</a:t>
-            </a:r>
-          </a:p>
-          <a:p>
-            <a:r>
-              <a:rPr lang="en-US" dirty="0"/>
-              <a:t>Evaluating key words in customer reviews (High vs Low ratings)</a:t>
-            </a:r>
-            <a:r>
-              <a:rPr lang="en-US" baseline="30000" dirty="0"/>
-              <a:t>5</a:t>
-            </a:r>
-          </a:p>
-          <a:p>
-            <a:r>
-              <a:rPr lang="en-US" dirty="0"/>
-              <a:t>Flu detection from Twitter text data</a:t>
-            </a:r>
-            <a:r>
-              <a:rPr lang="en-US" baseline="30000" dirty="0"/>
-              <a:t>6</a:t>
-            </a:r>
-            <a:r>
-              <a:rPr lang="en-US" dirty="0"/>
-              <a:t> </a:t>
-            </a:r>
-            <a:endParaRPr lang="en-US" baseline="30000" dirty="0"/>
-          </a:p>
-          <a:p>
-            <a:r>
-              <a:rPr lang="en-US" dirty="0"/>
-              <a:t>Exploring lateral genetic transfer among microbial genomes</a:t>
-            </a:r>
-            <a:r>
-              <a:rPr lang="en-US" baseline="30000" dirty="0"/>
-              <a:t>7</a:t>
-            </a:r>
-          </a:p>
-          <a:p>
-            <a:r>
-              <a:rPr lang="en-US" dirty="0"/>
-              <a:t>Also can be used to predict odds ratios for words appearing in different collections</a:t>
-            </a:r>
-            <a:r>
-              <a:rPr lang="en-US" baseline="30000" dirty="0"/>
-              <a:t>8 </a:t>
-            </a:r>
-          </a:p>
-          <a:p>
-            <a:r>
-              <a:rPr lang="en-US" dirty="0"/>
-              <a:t>Identifying misinformation and fake news</a:t>
-            </a:r>
-            <a:r>
-              <a:rPr lang="en-US" baseline="30000" dirty="0"/>
-              <a:t>9</a:t>
+            <a:pPr marL="0" indent="0" algn="ctr">
+              <a:buNone/>
+            </a:pPr>
+            <a:r>
+              <a:rPr lang="en-US" sz="5400" dirty="0"/>
+              <a:t>Every field of study has its own shared language.</a:t>
             </a:r>
           </a:p>
           <a:p>
             <a:pPr marL="0" indent="0">
               <a:buNone/>
             </a:pPr>
-            <a:endParaRPr lang="en-US" baseline="30000" dirty="0"/>
+            <a:endParaRPr lang="en-US" sz="5400" dirty="0"/>
+          </a:p>
+          <a:p>
+            <a:pPr marL="0" indent="0">
+              <a:buNone/>
+            </a:pPr>
+            <a:endParaRPr lang="en-US" sz="5400" dirty="0"/>
+          </a:p>
+          <a:p>
+            <a:pPr marL="0" indent="0">
+              <a:buNone/>
+            </a:pPr>
+            <a:r>
+              <a:rPr lang="en-US" sz="5400" dirty="0"/>
+              <a:t>Partner up: </a:t>
+            </a:r>
+          </a:p>
+          <a:p>
+            <a:pPr marL="0" indent="0">
+              <a:buNone/>
+            </a:pPr>
+            <a:r>
+              <a:rPr lang="en-US" sz="5400" dirty="0"/>
+              <a:t>1) Introduce yourself and your dept/field of study.</a:t>
+            </a:r>
+          </a:p>
+          <a:p>
+            <a:pPr marL="0" indent="0">
+              <a:buNone/>
+            </a:pPr>
+            <a:endParaRPr lang="en-US" sz="5400" dirty="0"/>
+          </a:p>
+          <a:p>
+            <a:pPr marL="0" indent="0">
+              <a:buNone/>
+            </a:pPr>
+            <a:r>
+              <a:rPr lang="en-US" sz="5400" dirty="0"/>
+              <a:t>2) What are some of the words that are specific to your department or field of study? (a high tf-idf)</a:t>
+            </a:r>
+          </a:p>
+          <a:p>
+            <a:pPr marL="0" indent="0">
+              <a:buNone/>
+            </a:pPr>
+            <a:endParaRPr lang="en-US" sz="5400" dirty="0"/>
+          </a:p>
+          <a:p>
+            <a:pPr marL="0" indent="0">
+              <a:buNone/>
+            </a:pPr>
+            <a:r>
+              <a:rPr lang="en-US" sz="5400" dirty="0"/>
+              <a:t>3) What are some words you two might share? (a low tf-idf)</a:t>
+            </a:r>
+          </a:p>
+          <a:p>
+            <a:pPr marL="0" indent="0">
+              <a:buNone/>
+            </a:pPr>
+            <a:endParaRPr lang="en-US" sz="5400" dirty="0"/>
+          </a:p>
+          <a:p>
+            <a:pPr marL="0" indent="0">
+              <a:buNone/>
+            </a:pPr>
+            <a:endParaRPr lang="en-US" sz="5400" dirty="0"/>
+          </a:p>
+          <a:p>
+            <a:pPr marL="0" indent="0">
+              <a:buNone/>
+            </a:pPr>
+            <a:endParaRPr lang="en-US" sz="5400" dirty="0"/>
           </a:p>
         </p:txBody>
       </p:sp>
     </p:spTree>
     <p:extLst>
       <p:ext uri="{BB962C8B-B14F-4D97-AF65-F5344CB8AC3E}">
-        <p14:creationId xmlns:p14="http://schemas.microsoft.com/office/powerpoint/2010/main" val="2557264850"/>
+        <p14:creationId xmlns:p14="http://schemas.microsoft.com/office/powerpoint/2010/main" val="1889349605"/>
       </p:ext>
     </p:extLst>
   </p:cSld>
@@ -5760,140 +6602,172 @@
           <a:chExt cx="0" cy="0"/>
         </a:xfrm>
       </p:grpSpPr>
-      <p:pic>
-        <p:nvPicPr>
-          <p:cNvPr id="5" name="Picture 4">
-            <a:extLst>
-              <a:ext uri="{FF2B5EF4-FFF2-40B4-BE49-F238E27FC236}">
-                <a16:creationId xmlns:a16="http://schemas.microsoft.com/office/drawing/2014/main" id="{FFEC47B8-CA06-40E7-A65E-B5B4C3635213}"/>
-              </a:ext>
-            </a:extLst>
-          </p:cNvPr>
-          <p:cNvPicPr>
-            <a:picLocks noChangeAspect="1"/>
-          </p:cNvPicPr>
-          <p:nvPr/>
-        </p:nvPicPr>
-        <p:blipFill>
-          <a:blip r:embed="rId2">
-            <a:extLst>
-              <a:ext uri="{28A0092B-C50C-407E-A947-70E740481C1C}">
-                <a14:useLocalDpi xmlns:a14="http://schemas.microsoft.com/office/drawing/2010/main" val="0"/>
-              </a:ext>
-            </a:extLst>
-          </a:blip>
-          <a:stretch>
-            <a:fillRect/>
-          </a:stretch>
-        </p:blipFill>
-        <p:spPr>
-          <a:xfrm>
-            <a:off x="7413725" y="1220787"/>
-            <a:ext cx="3995420" cy="5243513"/>
-          </a:xfrm>
-          <a:prstGeom prst="rect">
-            <a:avLst/>
-          </a:prstGeom>
-        </p:spPr>
-      </p:pic>
-      <p:sp>
-        <p:nvSpPr>
-          <p:cNvPr id="6" name="TextBox 5">
-            <a:extLst>
-              <a:ext uri="{FF2B5EF4-FFF2-40B4-BE49-F238E27FC236}">
-                <a16:creationId xmlns:a16="http://schemas.microsoft.com/office/drawing/2014/main" id="{16B0D076-EBEC-4E7C-AE53-F2B5B22CA4D3}"/>
-              </a:ext>
-            </a:extLst>
-          </p:cNvPr>
-          <p:cNvSpPr txBox="1"/>
-          <p:nvPr/>
-        </p:nvSpPr>
-        <p:spPr>
-          <a:xfrm>
-            <a:off x="957264" y="1951672"/>
-            <a:ext cx="5300662" cy="2523768"/>
-          </a:xfrm>
-          <a:prstGeom prst="rect">
-            <a:avLst/>
-          </a:prstGeom>
-          <a:noFill/>
-        </p:spPr>
-        <p:txBody>
-          <a:bodyPr wrap="square" rtlCol="0">
-            <a:spAutoFit/>
+      <p:sp>
+        <p:nvSpPr>
+          <p:cNvPr id="2" name="Title 1">
+            <a:extLst>
+              <a:ext uri="{FF2B5EF4-FFF2-40B4-BE49-F238E27FC236}">
+                <a16:creationId xmlns:a16="http://schemas.microsoft.com/office/drawing/2014/main" id="{D0041A93-90AE-4287-8C58-163297F2FF3C}"/>
+              </a:ext>
+            </a:extLst>
+          </p:cNvPr>
+          <p:cNvSpPr>
+            <a:spLocks noGrp="1"/>
+          </p:cNvSpPr>
+          <p:nvPr>
+            <p:ph type="title"/>
+          </p:nvPr>
+        </p:nvSpPr>
+        <p:spPr/>
+        <p:txBody>
+          <a:bodyPr/>
+          <a:lstStyle/>
+          <a:p>
+            <a:r>
+              <a:rPr lang="en-US" dirty="0"/>
+              <a:t>Let’s see what this might look like! </a:t>
+            </a:r>
+          </a:p>
+        </p:txBody>
+      </p:sp>
+      <p:sp>
+        <p:nvSpPr>
+          <p:cNvPr id="3" name="Content Placeholder 2">
+            <a:extLst>
+              <a:ext uri="{FF2B5EF4-FFF2-40B4-BE49-F238E27FC236}">
+                <a16:creationId xmlns:a16="http://schemas.microsoft.com/office/drawing/2014/main" id="{8FE7FA59-A299-4AF3-92CF-0B41EDD8AB35}"/>
+              </a:ext>
+            </a:extLst>
+          </p:cNvPr>
+          <p:cNvSpPr>
+            <a:spLocks noGrp="1"/>
+          </p:cNvSpPr>
+          <p:nvPr>
+            <p:ph idx="1"/>
+          </p:nvPr>
+        </p:nvSpPr>
+        <p:spPr/>
+        <p:txBody>
+          <a:bodyPr>
+            <a:normAutofit fontScale="85000" lnSpcReduction="20000"/>
           </a:bodyPr>
           <a:lstStyle/>
           <a:p>
-            <a:r>
-              <a:rPr lang="en-US" sz="2800" dirty="0"/>
-              <a:t>Text Mining with R by </a:t>
-            </a:r>
-          </a:p>
-          <a:p>
-            <a:r>
-              <a:rPr lang="en-US" sz="2800" dirty="0"/>
-              <a:t>Julia </a:t>
-            </a:r>
-            <a:r>
-              <a:rPr lang="en-US" sz="2800" dirty="0" err="1"/>
-              <a:t>Silge</a:t>
-            </a:r>
-            <a:r>
-              <a:rPr lang="en-US" sz="2800" dirty="0"/>
-              <a:t> and David Robinson</a:t>
-            </a:r>
-          </a:p>
-          <a:p>
-            <a:endParaRPr lang="en-US" sz="2800" dirty="0"/>
-          </a:p>
-          <a:p>
-            <a:r>
-              <a:rPr lang="en-US" sz="2800" dirty="0">
-                <a:hlinkClick r:id="rId3"/>
+            <a:pPr marL="514350" indent="-514350">
+              <a:buAutoNum type="arabicPeriod"/>
+            </a:pPr>
+            <a:r>
+              <a:rPr lang="en-US" dirty="0"/>
+              <a:t>Web-scrape bios of our BSHES Faculty and PhD students (or copy-paste it </a:t>
+            </a:r>
+            <a:r>
+              <a:rPr lang="en-US" dirty="0">
+                <a:sym typeface="Wingdings" panose="05000000000000000000" pitchFamily="2" charset="2"/>
               </a:rPr>
-              <a:t>https://www.tidytextmining.com/</a:t>
-            </a:r>
-            <a:endParaRPr lang="en-US" sz="2800" dirty="0"/>
-          </a:p>
-          <a:p>
-            <a:endParaRPr lang="en-US" sz="2800" dirty="0"/>
-          </a:p>
-          <a:p>
+              <a:t> )</a:t>
+            </a:r>
             <a:endParaRPr lang="en-US" dirty="0"/>
           </a:p>
-        </p:txBody>
-      </p:sp>
-      <p:sp>
-        <p:nvSpPr>
-          <p:cNvPr id="7" name="TextBox 6">
-            <a:extLst>
-              <a:ext uri="{FF2B5EF4-FFF2-40B4-BE49-F238E27FC236}">
-                <a16:creationId xmlns:a16="http://schemas.microsoft.com/office/drawing/2014/main" id="{C76D5CA2-EFB0-42AB-A0AE-40D802F71EA5}"/>
-              </a:ext>
-            </a:extLst>
-          </p:cNvPr>
-          <p:cNvSpPr txBox="1"/>
-          <p:nvPr/>
-        </p:nvSpPr>
-        <p:spPr>
-          <a:xfrm>
-            <a:off x="739413" y="585788"/>
-            <a:ext cx="4038863" cy="769441"/>
-          </a:xfrm>
-          <a:prstGeom prst="rect">
-            <a:avLst/>
-          </a:prstGeom>
-          <a:noFill/>
-        </p:spPr>
-        <p:txBody>
-          <a:bodyPr wrap="none" rtlCol="0">
-            <a:spAutoFit/>
-          </a:bodyPr>
-          <a:lstStyle/>
-          <a:p>
-            <a:r>
-              <a:rPr lang="en-US" sz="4400" dirty="0"/>
-              <a:t>Further reading: </a:t>
+          <a:p>
+            <a:pPr marL="514350" indent="-514350">
+              <a:buAutoNum type="arabicPeriod"/>
+            </a:pPr>
+            <a:r>
+              <a:rPr lang="en-US" dirty="0"/>
+              <a:t>Read data into R</a:t>
+            </a:r>
+          </a:p>
+          <a:p>
+            <a:pPr marL="514350" indent="-514350">
+              <a:buFont typeface="Arial" panose="020B0604020202020204" pitchFamily="34" charset="0"/>
+              <a:buAutoNum type="arabicPeriod"/>
+            </a:pPr>
+            <a:r>
+              <a:rPr lang="en-US" dirty="0"/>
+              <a:t>Text pre-processing– remove punctuation, stop-words (only if you want)</a:t>
+            </a:r>
+          </a:p>
+          <a:p>
+            <a:pPr marL="514350" indent="-514350">
+              <a:buFont typeface="Arial" panose="020B0604020202020204" pitchFamily="34" charset="0"/>
+              <a:buAutoNum type="arabicPeriod"/>
+            </a:pPr>
+            <a:r>
+              <a:rPr lang="en-US" dirty="0"/>
+              <a:t>Tokenize, or break texts into words </a:t>
+            </a:r>
+          </a:p>
+          <a:p>
+            <a:pPr marL="514350" indent="-514350">
+              <a:buFont typeface="Arial" panose="020B0604020202020204" pitchFamily="34" charset="0"/>
+              <a:buAutoNum type="arabicPeriod"/>
+            </a:pPr>
+            <a:r>
+              <a:rPr lang="en-US" dirty="0"/>
+              <a:t>Count up overall totals of words in the overall corpus</a:t>
+            </a:r>
+          </a:p>
+          <a:p>
+            <a:pPr marL="514350" indent="-514350">
+              <a:buFont typeface="Arial" panose="020B0604020202020204" pitchFamily="34" charset="0"/>
+              <a:buAutoNum type="arabicPeriod"/>
+            </a:pPr>
+            <a:r>
+              <a:rPr lang="en-US" dirty="0"/>
+              <a:t>Group by name </a:t>
+            </a:r>
+          </a:p>
+          <a:p>
+            <a:pPr marL="514350" indent="-514350">
+              <a:buFont typeface="Arial" panose="020B0604020202020204" pitchFamily="34" charset="0"/>
+              <a:buAutoNum type="arabicPeriod"/>
+            </a:pPr>
+            <a:r>
+              <a:rPr lang="en-US" dirty="0"/>
+              <a:t>Total words per person</a:t>
+            </a:r>
+          </a:p>
+          <a:p>
+            <a:pPr marL="514350" indent="-514350">
+              <a:buFont typeface="Arial" panose="020B0604020202020204" pitchFamily="34" charset="0"/>
+              <a:buAutoNum type="arabicPeriod"/>
+            </a:pPr>
+            <a:r>
+              <a:rPr lang="en-US" dirty="0"/>
+              <a:t>Calculate tf-idf</a:t>
+            </a:r>
+          </a:p>
+          <a:p>
+            <a:pPr marL="514350" indent="-514350">
+              <a:buFont typeface="Arial" panose="020B0604020202020204" pitchFamily="34" charset="0"/>
+              <a:buAutoNum type="arabicPeriod"/>
+            </a:pPr>
+            <a:r>
+              <a:rPr lang="en-US" dirty="0"/>
+              <a:t>Visualize top tf-idf terms per person.</a:t>
+            </a:r>
+            <a:endParaRPr lang="en-US" dirty="0">
+              <a:hlinkClick r:id="rId2"/>
+            </a:endParaRPr>
+          </a:p>
+          <a:p>
+            <a:pPr marL="0" indent="0">
+              <a:buNone/>
+            </a:pPr>
+            <a:endParaRPr lang="en-US" dirty="0">
+              <a:hlinkClick r:id="rId2"/>
+            </a:endParaRPr>
+          </a:p>
+          <a:p>
+            <a:r>
+              <a:rPr lang="en-US" dirty="0">
+                <a:hlinkClick r:id="rId2"/>
+              </a:rPr>
+              <a:t>https://github.com/drew-walkerr/tf_idf_lesson</a:t>
+            </a:r>
+            <a:r>
+              <a:rPr lang="en-US" dirty="0"/>
+              <a:t> </a:t>
             </a:r>
           </a:p>
         </p:txBody>
@@ -5901,7 +6775,7 @@
     </p:spTree>
     <p:extLst>
       <p:ext uri="{BB962C8B-B14F-4D97-AF65-F5344CB8AC3E}">
-        <p14:creationId xmlns:p14="http://schemas.microsoft.com/office/powerpoint/2010/main" val="2108982129"/>
+        <p14:creationId xmlns:p14="http://schemas.microsoft.com/office/powerpoint/2010/main" val="1209700120"/>
       </p:ext>
     </p:extLst>
   </p:cSld>
@@ -6502,21 +7376,6 @@
 </file>
 
 <file path=customXml/item1.xml><?xml version="1.0" encoding="utf-8"?>
-<p:properties xmlns:p="http://schemas.microsoft.com/office/2006/metadata/properties" xmlns:xsi="http://www.w3.org/2001/XMLSchema-instance" xmlns:pc="http://schemas.microsoft.com/office/infopath/2007/PartnerControls">
-  <documentManagement/>
-</p:properties>
-</file>
-
-<file path=customXml/item2.xml><?xml version="1.0" encoding="utf-8"?>
-<?mso-contentType ?>
-<FormTemplates xmlns="http://schemas.microsoft.com/sharepoint/v3/contenttype/forms">
-  <Display>DocumentLibraryForm</Display>
-  <Edit>DocumentLibraryForm</Edit>
-  <New>DocumentLibraryForm</New>
-</FormTemplates>
-</file>
-
-<file path=customXml/item3.xml><?xml version="1.0" encoding="utf-8"?>
 <ct:contentTypeSchema xmlns:ct="http://schemas.microsoft.com/office/2006/metadata/contentType" xmlns:ma="http://schemas.microsoft.com/office/2006/metadata/properties/metaAttributes" ct:_="" ma:_="" ma:contentTypeName="Document" ma:contentTypeID="0x0101003387ED48F8347B4F99B9ABBB4443B51D" ma:contentTypeVersion="13" ma:contentTypeDescription="Create a new document." ma:contentTypeScope="" ma:versionID="691b12703bb756f973feb2c74e08ed82">
   <xsd:schema xmlns:xsd="http://www.w3.org/2001/XMLSchema" xmlns:xs="http://www.w3.org/2001/XMLSchema" xmlns:p="http://schemas.microsoft.com/office/2006/metadata/properties" xmlns:ns3="3c2ef7f8-25ab-4e4e-9fe1-edade6317405" xmlns:ns4="91b045ff-9a25-4bb0-9524-84ad902d8afe" targetNamespace="http://schemas.microsoft.com/office/2006/metadata/properties" ma:root="true" ma:fieldsID="efbd087ef86be095aaa9baf9a14bc9db" ns3:_="" ns4:_="">
     <xsd:import namespace="3c2ef7f8-25ab-4e4e-9fe1-edade6317405"/>
@@ -6739,32 +7598,22 @@
 </ct:contentTypeSchema>
 </file>
 
-<file path=customXml/itemProps1.xml><?xml version="1.0" encoding="utf-8"?>
-<ds:datastoreItem xmlns:ds="http://schemas.openxmlformats.org/officeDocument/2006/customXml" ds:itemID="{38A2BDF4-460F-4FA0-9301-7C132E4289C3}">
-  <ds:schemaRefs>
-    <ds:schemaRef ds:uri="91b045ff-9a25-4bb0-9524-84ad902d8afe"/>
-    <ds:schemaRef ds:uri="http://purl.org/dc/terms/"/>
-    <ds:schemaRef ds:uri="http://schemas.openxmlformats.org/package/2006/metadata/core-properties"/>
-    <ds:schemaRef ds:uri="http://purl.org/dc/dcmitype/"/>
-    <ds:schemaRef ds:uri="http://schemas.microsoft.com/office/infopath/2007/PartnerControls"/>
-    <ds:schemaRef ds:uri="http://purl.org/dc/elements/1.1/"/>
-    <ds:schemaRef ds:uri="http://schemas.microsoft.com/office/2006/documentManagement/types"/>
-    <ds:schemaRef ds:uri="3c2ef7f8-25ab-4e4e-9fe1-edade6317405"/>
-    <ds:schemaRef ds:uri="http://schemas.microsoft.com/office/2006/metadata/properties"/>
-    <ds:schemaRef ds:uri="http://www.w3.org/XML/1998/namespace"/>
-  </ds:schemaRefs>
-</ds:datastoreItem>
+<file path=customXml/item2.xml><?xml version="1.0" encoding="utf-8"?>
+<?mso-contentType ?>
+<FormTemplates xmlns="http://schemas.microsoft.com/sharepoint/v3/contenttype/forms">
+  <Display>DocumentLibraryForm</Display>
+  <Edit>DocumentLibraryForm</Edit>
+  <New>DocumentLibraryForm</New>
+</FormTemplates>
 </file>
 
-<file path=customXml/itemProps2.xml><?xml version="1.0" encoding="utf-8"?>
-<ds:datastoreItem xmlns:ds="http://schemas.openxmlformats.org/officeDocument/2006/customXml" ds:itemID="{AF91E866-05F8-4855-A31B-EEF902A27E69}">
-  <ds:schemaRefs>
-    <ds:schemaRef ds:uri="http://schemas.microsoft.com/sharepoint/v3/contenttype/forms"/>
-  </ds:schemaRefs>
-</ds:datastoreItem>
+<file path=customXml/item3.xml><?xml version="1.0" encoding="utf-8"?>
+<p:properties xmlns:p="http://schemas.microsoft.com/office/2006/metadata/properties" xmlns:xsi="http://www.w3.org/2001/XMLSchema-instance" xmlns:pc="http://schemas.microsoft.com/office/infopath/2007/PartnerControls">
+  <documentManagement/>
+</p:properties>
 </file>
 
-<file path=customXml/itemProps3.xml><?xml version="1.0" encoding="utf-8"?>
+<file path=customXml/itemProps1.xml><?xml version="1.0" encoding="utf-8"?>
 <ds:datastoreItem xmlns:ds="http://schemas.openxmlformats.org/officeDocument/2006/customXml" ds:itemID="{E6824599-0197-48DC-AD25-285EAAED3C89}">
   <ds:schemaRefs>
     <ds:schemaRef ds:uri="http://schemas.microsoft.com/office/2006/metadata/contentType"/>
@@ -6781,4 +7630,29 @@
     <ds:schemaRef ds:uri="http://schemas.microsoft.com/internal/obd"/>
   </ds:schemaRefs>
 </ds:datastoreItem>
+</file>
+
+<file path=customXml/itemProps2.xml><?xml version="1.0" encoding="utf-8"?>
+<ds:datastoreItem xmlns:ds="http://schemas.openxmlformats.org/officeDocument/2006/customXml" ds:itemID="{AF91E866-05F8-4855-A31B-EEF902A27E69}">
+  <ds:schemaRefs>
+    <ds:schemaRef ds:uri="http://schemas.microsoft.com/sharepoint/v3/contenttype/forms"/>
+  </ds:schemaRefs>
+</ds:datastoreItem>
+</file>
+
+<file path=customXml/itemProps3.xml><?xml version="1.0" encoding="utf-8"?>
+<ds:datastoreItem xmlns:ds="http://schemas.openxmlformats.org/officeDocument/2006/customXml" ds:itemID="{38A2BDF4-460F-4FA0-9301-7C132E4289C3}">
+  <ds:schemaRefs>
+    <ds:schemaRef ds:uri="91b045ff-9a25-4bb0-9524-84ad902d8afe"/>
+    <ds:schemaRef ds:uri="http://purl.org/dc/terms/"/>
+    <ds:schemaRef ds:uri="http://schemas.openxmlformats.org/package/2006/metadata/core-properties"/>
+    <ds:schemaRef ds:uri="http://purl.org/dc/dcmitype/"/>
+    <ds:schemaRef ds:uri="http://schemas.microsoft.com/office/infopath/2007/PartnerControls"/>
+    <ds:schemaRef ds:uri="http://purl.org/dc/elements/1.1/"/>
+    <ds:schemaRef ds:uri="http://schemas.microsoft.com/office/2006/documentManagement/types"/>
+    <ds:schemaRef ds:uri="3c2ef7f8-25ab-4e4e-9fe1-edade6317405"/>
+    <ds:schemaRef ds:uri="http://schemas.microsoft.com/office/2006/metadata/properties"/>
+    <ds:schemaRef ds:uri="http://www.w3.org/XML/1998/namespace"/>
+  </ds:schemaRefs>
+</ds:datastoreItem>
 </file>
</xml_diff>